<commit_message>
Code samples updated to .Net 3.5 Linq to Objects sample added to show paging via web service callbacks.
</commit_message>
<xml_diff>
--- a/Samples/Intro-to-asp.net-ajax/Intro ASP.Net AJAX - Slide Deck.pptx
+++ b/Samples/Intro-to-asp.net-ajax/Intro ASP.Net AJAX - Slide Deck.pptx
@@ -5,7 +5,7 @@
     <p:sldMasterId id="2147483780" r:id="rId1"/>
   </p:sldMasterIdLst>
   <p:notesMasterIdLst>
-    <p:notesMasterId r:id="rId20"/>
+    <p:notesMasterId r:id="rId22"/>
   </p:notesMasterIdLst>
   <p:sldIdLst>
     <p:sldId id="256" r:id="rId2"/>
@@ -21,11 +21,13 @@
     <p:sldId id="280" r:id="rId12"/>
     <p:sldId id="266" r:id="rId13"/>
     <p:sldId id="267" r:id="rId14"/>
-    <p:sldId id="264" r:id="rId15"/>
-    <p:sldId id="276" r:id="rId16"/>
-    <p:sldId id="284" r:id="rId17"/>
-    <p:sldId id="274" r:id="rId18"/>
-    <p:sldId id="275" r:id="rId19"/>
+    <p:sldId id="285" r:id="rId15"/>
+    <p:sldId id="264" r:id="rId16"/>
+    <p:sldId id="276" r:id="rId17"/>
+    <p:sldId id="284" r:id="rId18"/>
+    <p:sldId id="286" r:id="rId19"/>
+    <p:sldId id="274" r:id="rId20"/>
+    <p:sldId id="275" r:id="rId21"/>
   </p:sldIdLst>
   <p:sldSz cx="9144000" cy="6858000" type="screen4x3"/>
   <p:notesSz cx="6858000" cy="9144000"/>
@@ -210,7 +212,7 @@
             <a:fld id="{B8CA705B-3C00-49E2-B709-40462F844435}" type="datetimeFigureOut">
               <a:rPr lang="en-US" smtClean="0"/>
               <a:pPr/>
-              <a:t>4/12/2008</a:t>
+              <a:t>4/15/2008</a:t>
             </a:fld>
             <a:endParaRPr lang="en-US"/>
           </a:p>
@@ -1050,11 +1052,7 @@
             </a:pPr>
             <a:r>
               <a:rPr lang="en-US" dirty="0" smtClean="0"/>
-              <a:t>You </a:t>
-            </a:r>
-            <a:r>
-              <a:rPr lang="en-US" dirty="0" smtClean="0"/>
-              <a:t>don’t create the page request manager, rather get the</a:t>
+              <a:t>You don’t create the page request manager, rather get the</a:t>
             </a:r>
             <a:r>
               <a:rPr lang="en-US" baseline="0" dirty="0" smtClean="0"/>
@@ -1224,11 +1222,7 @@
             </a:r>
             <a:r>
               <a:rPr lang="en-US" dirty="0" smtClean="0"/>
-              <a:t> - Raised after an asynchronous postback is finished and control has been returned to the browser. You can use this event to provide a notification to users or to log errors</a:t>
-            </a:r>
-            <a:r>
-              <a:rPr lang="en-US" dirty="0" smtClean="0"/>
-              <a:t>.</a:t>
+              <a:t> - Raised after an asynchronous postback is finished and control has been returned to the browser. You can use this event to provide a notification to users or to log errors.</a:t>
             </a:r>
           </a:p>
           <a:p>
@@ -1245,7 +1239,6 @@
               <a:rPr lang="en-US" b="1" dirty="0" smtClean="0"/>
               <a:t>&lt;Go to all update panel code here&gt;</a:t>
             </a:r>
-            <a:endParaRPr lang="en-US" b="1" dirty="0" smtClean="0"/>
           </a:p>
           <a:p>
             <a:pPr marL="228600" indent="-228600">
@@ -1340,162 +1333,25 @@
           <a:lstStyle/>
           <a:p>
             <a:pPr marL="228600" indent="-228600">
-              <a:buFont typeface="+mj-lt"/>
               <a:buAutoNum type="arabicPeriod"/>
             </a:pPr>
             <a:r>
               <a:rPr lang="en-US" dirty="0" smtClean="0"/>
-              <a:t>Closer</a:t>
-            </a:r>
-            <a:r>
-              <a:rPr lang="en-US" baseline="0" dirty="0" smtClean="0"/>
-              <a:t> to the other </a:t>
-            </a:r>
-            <a:r>
-              <a:rPr lang="en-US" baseline="0" dirty="0" err="1" smtClean="0"/>
-              <a:t>ajax</a:t>
-            </a:r>
-            <a:r>
-              <a:rPr lang="en-US" baseline="0" dirty="0" smtClean="0"/>
-              <a:t> </a:t>
-            </a:r>
-            <a:r>
-              <a:rPr lang="en-US" baseline="0" dirty="0" err="1" smtClean="0"/>
-              <a:t>js</a:t>
-            </a:r>
-            <a:r>
-              <a:rPr lang="en-US" baseline="0" dirty="0" smtClean="0"/>
-              <a:t> libraries</a:t>
-            </a:r>
-            <a:endParaRPr lang="en-US" dirty="0" smtClean="0"/>
-          </a:p>
-          <a:p>
-            <a:pPr marL="228600" indent="-228600">
-              <a:buFont typeface="+mj-lt"/>
-              <a:buAutoNum type="arabicPeriod"/>
-            </a:pPr>
-            <a:r>
-              <a:rPr lang="en-US" dirty="0" err="1" smtClean="0"/>
-              <a:t>Async</a:t>
-            </a:r>
-            <a:r>
-              <a:rPr lang="en-US" baseline="0" dirty="0" smtClean="0"/>
-              <a:t> callbacks to web services</a:t>
-            </a:r>
-          </a:p>
-          <a:p>
-            <a:pPr marL="685800" lvl="1" indent="-228600">
-              <a:buFont typeface="+mj-lt"/>
-              <a:buAutoNum type="arabicPeriod"/>
-            </a:pPr>
-            <a:r>
-              <a:rPr lang="en-US" baseline="0" dirty="0" smtClean="0"/>
-              <a:t>Use public services on the net</a:t>
-            </a:r>
-          </a:p>
-          <a:p>
-            <a:pPr marL="685800" lvl="1" indent="-228600">
-              <a:buFont typeface="+mj-lt"/>
-              <a:buAutoNum type="arabicPeriod"/>
-            </a:pPr>
-            <a:r>
-              <a:rPr lang="en-US" baseline="0" dirty="0" smtClean="0"/>
-              <a:t>Use local services, </a:t>
-            </a:r>
-            <a:r>
-              <a:rPr lang="en-US" baseline="0" dirty="0" err="1" smtClean="0"/>
-              <a:t>wcf</a:t>
-            </a:r>
-            <a:r>
-              <a:rPr lang="en-US" baseline="0" dirty="0" smtClean="0"/>
-              <a:t>, </a:t>
-            </a:r>
-            <a:r>
-              <a:rPr lang="en-US" baseline="0" dirty="0" err="1" smtClean="0"/>
-              <a:t>asmx</a:t>
-            </a:r>
-            <a:endParaRPr lang="en-US" baseline="0" dirty="0" smtClean="0"/>
-          </a:p>
-          <a:p>
-            <a:pPr marL="685800" lvl="1" indent="-228600">
-              <a:buFont typeface="+mj-lt"/>
-              <a:buAutoNum type="arabicPeriod"/>
-            </a:pPr>
-            <a:r>
-              <a:rPr lang="en-US" baseline="0" dirty="0" smtClean="0"/>
-              <a:t>Call page methods in </a:t>
-            </a:r>
-            <a:r>
-              <a:rPr lang="en-US" baseline="0" dirty="0" err="1" smtClean="0"/>
-              <a:t>aspx</a:t>
-            </a:r>
-            <a:r>
-              <a:rPr lang="en-US" baseline="0" dirty="0" smtClean="0"/>
-              <a:t> </a:t>
-            </a:r>
-            <a:r>
-              <a:rPr lang="en-US" baseline="0" dirty="0" err="1" smtClean="0"/>
-              <a:t>codebehinds</a:t>
-            </a:r>
-            <a:r>
-              <a:rPr lang="en-US" baseline="0" dirty="0" smtClean="0"/>
-              <a:t> decorate with [</a:t>
-            </a:r>
-            <a:r>
-              <a:rPr lang="en-US" baseline="0" dirty="0" err="1" smtClean="0"/>
-              <a:t>WebMethod</a:t>
-            </a:r>
-            <a:r>
-              <a:rPr lang="en-US" baseline="0" dirty="0" smtClean="0"/>
-              <a:t>], include </a:t>
-            </a:r>
-            <a:r>
-              <a:rPr lang="en-US" baseline="0" dirty="0" err="1" smtClean="0"/>
-              <a:t>scriptservice</a:t>
-            </a:r>
-            <a:endParaRPr lang="en-US" dirty="0" smtClean="0"/>
-          </a:p>
-          <a:p>
-            <a:pPr marL="228600" indent="-228600">
-              <a:buFont typeface="+mj-lt"/>
-              <a:buAutoNum type="arabicPeriod"/>
-            </a:pPr>
-            <a:r>
-              <a:rPr lang="en-US" dirty="0" smtClean="0"/>
-              <a:t>JSON</a:t>
-            </a:r>
-          </a:p>
-          <a:p>
-            <a:pPr marL="228600" indent="-228600">
-              <a:buFont typeface="+mj-lt"/>
-              <a:buAutoNum type="arabicPeriod"/>
-            </a:pPr>
-            <a:r>
-              <a:rPr lang="en-US" dirty="0" smtClean="0"/>
-              <a:t>Can return strongly typed objects</a:t>
-            </a:r>
-          </a:p>
-          <a:p>
-            <a:pPr marL="685800" lvl="1" indent="-228600">
-              <a:buFont typeface="+mj-lt"/>
-              <a:buAutoNum type="arabicPeriod"/>
-            </a:pPr>
-            <a:r>
-              <a:rPr lang="en-US" dirty="0" smtClean="0"/>
-              <a:t>Fully qualified on client</a:t>
-            </a:r>
-          </a:p>
-          <a:p>
-            <a:pPr marL="685800" lvl="1" indent="-228600">
-              <a:buFont typeface="+mj-lt"/>
-              <a:buAutoNum type="arabicPeriod"/>
-            </a:pPr>
-            <a:endParaRPr lang="en-US" dirty="0" smtClean="0"/>
+              <a:t>New app</a:t>
+            </a:r>
           </a:p>
           <a:p>
             <a:pPr marL="228600" indent="-228600">
               <a:buAutoNum type="arabicPeriod"/>
             </a:pPr>
+            <a:r>
+              <a:rPr lang="en-US" dirty="0" smtClean="0"/>
+              <a:t>Demo</a:t>
+            </a:r>
+            <a:r>
+              <a:rPr lang="en-US" baseline="0" dirty="0" smtClean="0"/>
+              <a:t> app</a:t>
+            </a:r>
             <a:endParaRPr lang="en-US" dirty="0"/>
           </a:p>
         </p:txBody>
@@ -1515,7 +1371,7 @@
           <a:bodyPr/>
           <a:lstStyle/>
           <a:p>
-            <a:fld id="{D55A58F0-34EB-4AC8-8F16-CAEFD6BDFC59}" type="slidenum">
+            <a:fld id="{F8007F4E-10F5-4104-9EF8-E98D370060A3}" type="slidenum">
               <a:rPr lang="en-US" smtClean="0"/>
               <a:pPr/>
               <a:t>14</a:t>
@@ -1584,16 +1440,29 @@
             </a:pPr>
             <a:r>
               <a:rPr lang="en-US" dirty="0" smtClean="0"/>
-              <a:t>Lightweight and quick – </a:t>
-            </a:r>
-            <a:r>
-              <a:rPr lang="en-US" dirty="0" err="1" smtClean="0"/>
-              <a:t>kachow</a:t>
-            </a:r>
-            <a:r>
-              <a:rPr lang="en-US" dirty="0" smtClean="0"/>
-              <a:t>!</a:t>
-            </a:r>
+              <a:t>Closer</a:t>
+            </a:r>
+            <a:r>
+              <a:rPr lang="en-US" baseline="0" dirty="0" smtClean="0"/>
+              <a:t> to the other </a:t>
+            </a:r>
+            <a:r>
+              <a:rPr lang="en-US" baseline="0" dirty="0" err="1" smtClean="0"/>
+              <a:t>ajax</a:t>
+            </a:r>
+            <a:r>
+              <a:rPr lang="en-US" baseline="0" dirty="0" smtClean="0"/>
+              <a:t> </a:t>
+            </a:r>
+            <a:r>
+              <a:rPr lang="en-US" baseline="0" dirty="0" err="1" smtClean="0"/>
+              <a:t>js</a:t>
+            </a:r>
+            <a:r>
+              <a:rPr lang="en-US" baseline="0" dirty="0" smtClean="0"/>
+              <a:t> libraries</a:t>
+            </a:r>
+            <a:endParaRPr lang="en-US" dirty="0" smtClean="0"/>
           </a:p>
           <a:p>
             <a:pPr marL="228600" indent="-228600">
@@ -1601,9 +1470,85 @@
               <a:buAutoNum type="arabicPeriod"/>
             </a:pPr>
             <a:r>
-              <a:rPr lang="en-US" dirty="0" smtClean="0"/>
-              <a:t>No page lifecycle involved</a:t>
-            </a:r>
+              <a:rPr lang="en-US" dirty="0" err="1" smtClean="0"/>
+              <a:t>Async</a:t>
+            </a:r>
+            <a:r>
+              <a:rPr lang="en-US" baseline="0" dirty="0" smtClean="0"/>
+              <a:t> callbacks to web services</a:t>
+            </a:r>
+          </a:p>
+          <a:p>
+            <a:pPr marL="685800" lvl="1" indent="-228600">
+              <a:buFont typeface="+mj-lt"/>
+              <a:buAutoNum type="arabicPeriod"/>
+            </a:pPr>
+            <a:r>
+              <a:rPr lang="en-US" baseline="0" dirty="0" smtClean="0"/>
+              <a:t>Use public services on the net</a:t>
+            </a:r>
+          </a:p>
+          <a:p>
+            <a:pPr marL="685800" lvl="1" indent="-228600">
+              <a:buFont typeface="+mj-lt"/>
+              <a:buAutoNum type="arabicPeriod"/>
+            </a:pPr>
+            <a:r>
+              <a:rPr lang="en-US" baseline="0" dirty="0" smtClean="0"/>
+              <a:t>Use local services, </a:t>
+            </a:r>
+            <a:r>
+              <a:rPr lang="en-US" baseline="0" dirty="0" err="1" smtClean="0"/>
+              <a:t>wcf</a:t>
+            </a:r>
+            <a:r>
+              <a:rPr lang="en-US" baseline="0" dirty="0" smtClean="0"/>
+              <a:t>, </a:t>
+            </a:r>
+            <a:r>
+              <a:rPr lang="en-US" baseline="0" dirty="0" err="1" smtClean="0"/>
+              <a:t>asmx</a:t>
+            </a:r>
+            <a:endParaRPr lang="en-US" baseline="0" dirty="0" smtClean="0"/>
+          </a:p>
+          <a:p>
+            <a:pPr marL="685800" lvl="1" indent="-228600">
+              <a:buFont typeface="+mj-lt"/>
+              <a:buAutoNum type="arabicPeriod"/>
+            </a:pPr>
+            <a:r>
+              <a:rPr lang="en-US" baseline="0" dirty="0" smtClean="0"/>
+              <a:t>Call page methods in </a:t>
+            </a:r>
+            <a:r>
+              <a:rPr lang="en-US" baseline="0" dirty="0" err="1" smtClean="0"/>
+              <a:t>aspx</a:t>
+            </a:r>
+            <a:r>
+              <a:rPr lang="en-US" baseline="0" dirty="0" smtClean="0"/>
+              <a:t> </a:t>
+            </a:r>
+            <a:r>
+              <a:rPr lang="en-US" baseline="0" dirty="0" err="1" smtClean="0"/>
+              <a:t>codebehinds</a:t>
+            </a:r>
+            <a:r>
+              <a:rPr lang="en-US" baseline="0" dirty="0" smtClean="0"/>
+              <a:t> decorate with [</a:t>
+            </a:r>
+            <a:r>
+              <a:rPr lang="en-US" baseline="0" dirty="0" err="1" smtClean="0"/>
+              <a:t>WebMethod</a:t>
+            </a:r>
+            <a:r>
+              <a:rPr lang="en-US" baseline="0" dirty="0" smtClean="0"/>
+              <a:t>], include </a:t>
+            </a:r>
+            <a:r>
+              <a:rPr lang="en-US" baseline="0" dirty="0" err="1" smtClean="0"/>
+              <a:t>scriptservice</a:t>
+            </a:r>
+            <a:endParaRPr lang="en-US" dirty="0" smtClean="0"/>
           </a:p>
           <a:p>
             <a:pPr marL="228600" indent="-228600">
@@ -1612,10 +1557,40 @@
             </a:pPr>
             <a:r>
               <a:rPr lang="en-US" dirty="0" smtClean="0"/>
-              <a:t>Reuse via web services</a:t>
-            </a:r>
-          </a:p>
-          <a:p>
+              <a:t>JSON</a:t>
+            </a:r>
+          </a:p>
+          <a:p>
+            <a:pPr marL="228600" indent="-228600">
+              <a:buFont typeface="+mj-lt"/>
+              <a:buAutoNum type="arabicPeriod"/>
+            </a:pPr>
+            <a:r>
+              <a:rPr lang="en-US" dirty="0" smtClean="0"/>
+              <a:t>Can return strongly typed objects</a:t>
+            </a:r>
+          </a:p>
+          <a:p>
+            <a:pPr marL="685800" lvl="1" indent="-228600">
+              <a:buFont typeface="+mj-lt"/>
+              <a:buAutoNum type="arabicPeriod"/>
+            </a:pPr>
+            <a:r>
+              <a:rPr lang="en-US" dirty="0" smtClean="0"/>
+              <a:t>Fully qualified on client</a:t>
+            </a:r>
+          </a:p>
+          <a:p>
+            <a:pPr marL="685800" lvl="1" indent="-228600">
+              <a:buFont typeface="+mj-lt"/>
+              <a:buAutoNum type="arabicPeriod"/>
+            </a:pPr>
+            <a:endParaRPr lang="en-US" dirty="0" smtClean="0"/>
+          </a:p>
+          <a:p>
+            <a:pPr marL="228600" indent="-228600">
+              <a:buAutoNum type="arabicPeriod"/>
+            </a:pPr>
             <a:endParaRPr lang="en-US" dirty="0"/>
           </a:p>
         </p:txBody>
@@ -1698,36 +1673,21 @@
           </a:bodyPr>
           <a:lstStyle/>
           <a:p>
-            <a:pPr marL="228600" marR="0" indent="-228600" algn="l" defTabSz="914400" rtl="0" eaLnBrk="1" fontAlgn="auto" latinLnBrk="0" hangingPunct="1">
-              <a:lnSpc>
-                <a:spcPct val="100000"/>
-              </a:lnSpc>
-              <a:spcBef>
-                <a:spcPts val="0"/>
-              </a:spcBef>
-              <a:spcAft>
-                <a:spcPts val="0"/>
-              </a:spcAft>
-              <a:buClrTx/>
-              <a:buSzTx/>
-              <a:buFont typeface="+mj-lt"/>
-              <a:buAutoNum type="arabicPeriod"/>
-              <a:tabLst/>
-              <a:defRPr/>
-            </a:pPr>
-            <a:r>
-              <a:rPr lang="en-US" dirty="0" smtClean="0"/>
-              <a:t>Not drag and drop “easy” like update panels</a:t>
-            </a:r>
-          </a:p>
-          <a:p>
             <a:pPr marL="228600" indent="-228600">
               <a:buFont typeface="+mj-lt"/>
               <a:buAutoNum type="arabicPeriod"/>
             </a:pPr>
             <a:r>
               <a:rPr lang="en-US" dirty="0" smtClean="0"/>
-              <a:t>Heavy client script</a:t>
+              <a:t>Lightweight and quick – </a:t>
+            </a:r>
+            <a:r>
+              <a:rPr lang="en-US" dirty="0" err="1" smtClean="0"/>
+              <a:t>kachow</a:t>
+            </a:r>
+            <a:r>
+              <a:rPr lang="en-US" dirty="0" smtClean="0"/>
+              <a:t>!</a:t>
             </a:r>
           </a:p>
           <a:p>
@@ -1737,7 +1697,7 @@
             </a:pPr>
             <a:r>
               <a:rPr lang="en-US" dirty="0" smtClean="0"/>
-              <a:t>More difficult debugging</a:t>
+              <a:t>No page lifecycle involved</a:t>
             </a:r>
           </a:p>
           <a:p>
@@ -1747,60 +1707,11 @@
             </a:pPr>
             <a:r>
               <a:rPr lang="en-US" dirty="0" smtClean="0"/>
-              <a:t>Response</a:t>
-            </a:r>
-            <a:r>
-              <a:rPr lang="en-US" baseline="0" dirty="0" smtClean="0"/>
-              <a:t> is always a string. Large data can defeat the purpose of using the client.</a:t>
-            </a:r>
-          </a:p>
-          <a:p>
-            <a:pPr marL="228600" indent="-228600">
-              <a:buFont typeface="+mj-lt"/>
-              <a:buAutoNum type="arabicPeriod"/>
-            </a:pPr>
-            <a:r>
-              <a:rPr lang="en-US" baseline="0" dirty="0" smtClean="0"/>
-              <a:t>Multiple callbacks can get messy</a:t>
-            </a:r>
-          </a:p>
-          <a:p>
-            <a:pPr marL="685800" lvl="1" indent="-228600">
-              <a:buFont typeface="+mj-lt"/>
-              <a:buAutoNum type="arabicPeriod"/>
-            </a:pPr>
-            <a:r>
-              <a:rPr lang="en-US" baseline="0" dirty="0" smtClean="0"/>
-              <a:t>All handled by </a:t>
-            </a:r>
-            <a:r>
-              <a:rPr lang="en-US" baseline="0" dirty="0" err="1" smtClean="0"/>
-              <a:t>RaiseCallbackEvent</a:t>
-            </a:r>
-            <a:endParaRPr lang="en-US" baseline="0" dirty="0" smtClean="0"/>
-          </a:p>
-          <a:p>
-            <a:pPr marL="685800" lvl="1" indent="-228600">
-              <a:buFont typeface="+mj-lt"/>
-              <a:buAutoNum type="arabicPeriod"/>
-            </a:pPr>
-            <a:r>
-              <a:rPr lang="en-US" baseline="0" dirty="0" smtClean="0"/>
-              <a:t>If more than one call comes in, </a:t>
-            </a:r>
-            <a:r>
-              <a:rPr lang="en-US" baseline="0" dirty="0" err="1" smtClean="0"/>
-              <a:t>GetCallBackEventReference</a:t>
-            </a:r>
-            <a:r>
-              <a:rPr lang="en-US" baseline="0" dirty="0" smtClean="0"/>
-              <a:t> is needed, which will in turn be handled by </a:t>
-            </a:r>
-            <a:r>
-              <a:rPr lang="en-US" baseline="0" dirty="0" err="1" smtClean="0"/>
-              <a:t>RaiseCallbackEvent</a:t>
-            </a:r>
-            <a:endParaRPr lang="en-US" dirty="0" smtClean="0"/>
+              <a:t>Reuse via web services</a:t>
+            </a:r>
+          </a:p>
+          <a:p>
+            <a:endParaRPr lang="en-US" dirty="0"/>
           </a:p>
         </p:txBody>
       </p:sp>
@@ -1882,54 +1793,109 @@
           </a:bodyPr>
           <a:lstStyle/>
           <a:p>
+            <a:pPr marL="228600" marR="0" indent="-228600" algn="l" defTabSz="914400" rtl="0" eaLnBrk="1" fontAlgn="auto" latinLnBrk="0" hangingPunct="1">
+              <a:lnSpc>
+                <a:spcPct val="100000"/>
+              </a:lnSpc>
+              <a:spcBef>
+                <a:spcPts val="0"/>
+              </a:spcBef>
+              <a:spcAft>
+                <a:spcPts val="0"/>
+              </a:spcAft>
+              <a:buClrTx/>
+              <a:buSzTx/>
+              <a:buFont typeface="+mj-lt"/>
+              <a:buAutoNum type="arabicPeriod"/>
+              <a:tabLst/>
+              <a:defRPr/>
+            </a:pPr>
+            <a:r>
+              <a:rPr lang="en-US" dirty="0" smtClean="0"/>
+              <a:t>Not drag and drop “easy” like update panels</a:t>
+            </a:r>
+          </a:p>
+          <a:p>
             <a:pPr marL="228600" indent="-228600">
+              <a:buFont typeface="+mj-lt"/>
               <a:buAutoNum type="arabicPeriod"/>
             </a:pPr>
             <a:r>
-              <a:rPr lang="en-US" baseline="0" dirty="0" smtClean="0"/>
-              <a:t>Microsoft link has the documentation and the forums</a:t>
+              <a:rPr lang="en-US" dirty="0" smtClean="0"/>
+              <a:t>Heavy client script</a:t>
             </a:r>
           </a:p>
           <a:p>
             <a:pPr marL="228600" indent="-228600">
+              <a:buFont typeface="+mj-lt"/>
               <a:buAutoNum type="arabicPeriod"/>
             </a:pPr>
             <a:r>
-              <a:rPr lang="en-US" baseline="0" dirty="0" smtClean="0"/>
-              <a:t>Toolkit has a running sample, and you get the source and sample with the download</a:t>
+              <a:rPr lang="en-US" dirty="0" smtClean="0"/>
+              <a:t>More difficult debugging</a:t>
             </a:r>
           </a:p>
           <a:p>
             <a:pPr marL="228600" indent="-228600">
+              <a:buFont typeface="+mj-lt"/>
               <a:buAutoNum type="arabicPeriod"/>
             </a:pPr>
             <a:r>
+              <a:rPr lang="en-US" dirty="0" smtClean="0"/>
+              <a:t>Response</a:t>
+            </a:r>
+            <a:r>
               <a:rPr lang="en-US" baseline="0" dirty="0" smtClean="0"/>
-              <a:t>Scott Guthrie will have a link wrap-up every few weeks with some great AJAX stuff in addition to his own. A few of the links are to…</a:t>
+              <a:t> is always a string. Large data can defeat the purpose of using the client.</a:t>
             </a:r>
           </a:p>
           <a:p>
             <a:pPr marL="228600" indent="-228600">
+              <a:buFont typeface="+mj-lt"/>
               <a:buAutoNum type="arabicPeriod"/>
             </a:pPr>
             <a:r>
               <a:rPr lang="en-US" baseline="0" dirty="0" smtClean="0"/>
-              <a:t>Matt </a:t>
-            </a:r>
-            <a:r>
-              <a:rPr lang="en-US" baseline="0" dirty="0" err="1" smtClean="0"/>
-              <a:t>Berseth’s</a:t>
-            </a:r>
-            <a:r>
-              <a:rPr lang="en-US" baseline="0" dirty="0" smtClean="0"/>
-              <a:t> blog. Matt is doing some fun stuff with the toolkit.</a:t>
-            </a:r>
-          </a:p>
-          <a:p>
-            <a:pPr marL="228600" indent="-228600">
+              <a:t>Multiple callbacks can get messy</a:t>
+            </a:r>
+          </a:p>
+          <a:p>
+            <a:pPr marL="685800" lvl="1" indent="-228600">
+              <a:buFont typeface="+mj-lt"/>
               <a:buAutoNum type="arabicPeriod"/>
             </a:pPr>
-            <a:endParaRPr lang="en-US" dirty="0"/>
+            <a:r>
+              <a:rPr lang="en-US" baseline="0" dirty="0" smtClean="0"/>
+              <a:t>All handled by </a:t>
+            </a:r>
+            <a:r>
+              <a:rPr lang="en-US" baseline="0" dirty="0" err="1" smtClean="0"/>
+              <a:t>RaiseCallbackEvent</a:t>
+            </a:r>
+            <a:endParaRPr lang="en-US" baseline="0" dirty="0" smtClean="0"/>
+          </a:p>
+          <a:p>
+            <a:pPr marL="685800" lvl="1" indent="-228600">
+              <a:buFont typeface="+mj-lt"/>
+              <a:buAutoNum type="arabicPeriod"/>
+            </a:pPr>
+            <a:r>
+              <a:rPr lang="en-US" baseline="0" dirty="0" smtClean="0"/>
+              <a:t>If more than one call comes in, </a:t>
+            </a:r>
+            <a:r>
+              <a:rPr lang="en-US" baseline="0" dirty="0" err="1" smtClean="0"/>
+              <a:t>GetCallBackEventReference</a:t>
+            </a:r>
+            <a:r>
+              <a:rPr lang="en-US" baseline="0" dirty="0" smtClean="0"/>
+              <a:t> is needed, which will in turn be handled by </a:t>
+            </a:r>
+            <a:r>
+              <a:rPr lang="en-US" baseline="0" dirty="0" err="1" smtClean="0"/>
+              <a:t>RaiseCallbackEvent</a:t>
+            </a:r>
+            <a:endParaRPr lang="en-US" dirty="0" smtClean="0"/>
           </a:p>
         </p:txBody>
       </p:sp>
@@ -2011,28 +1977,156 @@
           </a:bodyPr>
           <a:lstStyle/>
           <a:p>
-            <a:pPr marL="228600" marR="0" indent="-228600" algn="l" defTabSz="914400" rtl="0" eaLnBrk="1" fontAlgn="auto" latinLnBrk="0" hangingPunct="1">
-              <a:lnSpc>
-                <a:spcPct val="100000"/>
-              </a:lnSpc>
-              <a:spcBef>
-                <a:spcPts val="0"/>
-              </a:spcBef>
-              <a:spcAft>
-                <a:spcPts val="0"/>
-              </a:spcAft>
-              <a:buClrTx/>
-              <a:buSzTx/>
-              <a:buFontTx/>
+            <a:pPr marL="228600" indent="-228600">
               <a:buAutoNum type="arabicPeriod"/>
-              <a:tabLst/>
-              <a:defRPr/>
             </a:pPr>
             <a:r>
-              <a:rPr lang="en-US" baseline="0" smtClean="0"/>
-              <a:t>Questions?</a:t>
-            </a:r>
-            <a:endParaRPr lang="en-US" baseline="0" dirty="0" smtClean="0"/>
+              <a:rPr lang="en-US" dirty="0" smtClean="0"/>
+              <a:t>New app</a:t>
+            </a:r>
+          </a:p>
+          <a:p>
+            <a:pPr marL="228600" indent="-228600">
+              <a:buAutoNum type="arabicPeriod"/>
+            </a:pPr>
+            <a:r>
+              <a:rPr lang="en-US" dirty="0" smtClean="0"/>
+              <a:t>Demo</a:t>
+            </a:r>
+            <a:r>
+              <a:rPr lang="en-US" baseline="0" dirty="0" smtClean="0"/>
+              <a:t> app</a:t>
+            </a:r>
+            <a:endParaRPr lang="en-US" dirty="0"/>
+          </a:p>
+        </p:txBody>
+      </p:sp>
+      <p:sp>
+        <p:nvSpPr>
+          <p:cNvPr id="4" name="Slide Number Placeholder 3"/>
+          <p:cNvSpPr>
+            <a:spLocks noGrp="1"/>
+          </p:cNvSpPr>
+          <p:nvPr>
+            <p:ph type="sldNum" sz="quarter" idx="10"/>
+          </p:nvPr>
+        </p:nvSpPr>
+        <p:spPr/>
+        <p:txBody>
+          <a:bodyPr/>
+          <a:lstStyle/>
+          <a:p>
+            <a:fld id="{F8007F4E-10F5-4104-9EF8-E98D370060A3}" type="slidenum">
+              <a:rPr lang="en-US" smtClean="0"/>
+              <a:pPr/>
+              <a:t>18</a:t>
+            </a:fld>
+            <a:endParaRPr lang="en-US"/>
+          </a:p>
+        </p:txBody>
+      </p:sp>
+    </p:spTree>
+  </p:cSld>
+  <p:clrMapOvr>
+    <a:masterClrMapping/>
+  </p:clrMapOvr>
+</p:notes>
+</file>
+
+<file path=ppt/notesSlides/notesSlide19.xml><?xml version="1.0" encoding="utf-8"?>
+<p:notes xmlns:a="http://schemas.openxmlformats.org/drawingml/2006/main" xmlns:r="http://schemas.openxmlformats.org/officeDocument/2006/relationships" xmlns:p="http://schemas.openxmlformats.org/presentationml/2006/main">
+  <p:cSld>
+    <p:spTree>
+      <p:nvGrpSpPr>
+        <p:cNvPr id="1" name=""/>
+        <p:cNvGrpSpPr/>
+        <p:nvPr/>
+      </p:nvGrpSpPr>
+      <p:grpSpPr>
+        <a:xfrm>
+          <a:off x="0" y="0"/>
+          <a:ext cx="0" cy="0"/>
+          <a:chOff x="0" y="0"/>
+          <a:chExt cx="0" cy="0"/>
+        </a:xfrm>
+      </p:grpSpPr>
+      <p:sp>
+        <p:nvSpPr>
+          <p:cNvPr id="2" name="Slide Image Placeholder 1"/>
+          <p:cNvSpPr>
+            <a:spLocks noGrp="1" noRot="1" noChangeAspect="1"/>
+          </p:cNvSpPr>
+          <p:nvPr>
+            <p:ph type="sldImg"/>
+          </p:nvPr>
+        </p:nvSpPr>
+        <p:spPr/>
+      </p:sp>
+      <p:sp>
+        <p:nvSpPr>
+          <p:cNvPr id="3" name="Notes Placeholder 2"/>
+          <p:cNvSpPr>
+            <a:spLocks noGrp="1"/>
+          </p:cNvSpPr>
+          <p:nvPr>
+            <p:ph type="body" idx="1"/>
+          </p:nvPr>
+        </p:nvSpPr>
+        <p:spPr/>
+        <p:txBody>
+          <a:bodyPr>
+            <a:normAutofit/>
+          </a:bodyPr>
+          <a:lstStyle/>
+          <a:p>
+            <a:pPr marL="228600" indent="-228600">
+              <a:buAutoNum type="arabicPeriod"/>
+            </a:pPr>
+            <a:r>
+              <a:rPr lang="en-US" baseline="0" dirty="0" smtClean="0"/>
+              <a:t>Microsoft link has the documentation and the forums</a:t>
+            </a:r>
+          </a:p>
+          <a:p>
+            <a:pPr marL="228600" indent="-228600">
+              <a:buAutoNum type="arabicPeriod"/>
+            </a:pPr>
+            <a:r>
+              <a:rPr lang="en-US" baseline="0" dirty="0" smtClean="0"/>
+              <a:t>Toolkit has a running sample, and you get the source and sample with the download</a:t>
+            </a:r>
+          </a:p>
+          <a:p>
+            <a:pPr marL="228600" indent="-228600">
+              <a:buAutoNum type="arabicPeriod"/>
+            </a:pPr>
+            <a:r>
+              <a:rPr lang="en-US" baseline="0" dirty="0" smtClean="0"/>
+              <a:t>Scott Guthrie will have a link wrap-up every few weeks with some great AJAX stuff in addition to his own. A few of the links are to…</a:t>
+            </a:r>
+          </a:p>
+          <a:p>
+            <a:pPr marL="228600" indent="-228600">
+              <a:buAutoNum type="arabicPeriod"/>
+            </a:pPr>
+            <a:r>
+              <a:rPr lang="en-US" baseline="0" dirty="0" smtClean="0"/>
+              <a:t>Matt </a:t>
+            </a:r>
+            <a:r>
+              <a:rPr lang="en-US" baseline="0" dirty="0" err="1" smtClean="0"/>
+              <a:t>Berseth’s</a:t>
+            </a:r>
+            <a:r>
+              <a:rPr lang="en-US" baseline="0" dirty="0" smtClean="0"/>
+              <a:t> blog. Matt is doing some fun stuff with the toolkit.</a:t>
+            </a:r>
+          </a:p>
+          <a:p>
+            <a:pPr marL="228600" indent="-228600">
+              <a:buAutoNum type="arabicPeriod"/>
+            </a:pPr>
+            <a:endParaRPr lang="en-US" dirty="0"/>
           </a:p>
         </p:txBody>
       </p:sp>
@@ -2054,7 +2148,7 @@
             <a:fld id="{D55A58F0-34EB-4AC8-8F16-CAEFD6BDFC59}" type="slidenum">
               <a:rPr lang="en-US" smtClean="0"/>
               <a:pPr/>
-              <a:t>18</a:t>
+              <a:t>19</a:t>
             </a:fld>
             <a:endParaRPr lang="en-US"/>
           </a:p>
@@ -2198,6 +2292,109 @@
 </p:notes>
 </file>
 
+<file path=ppt/notesSlides/notesSlide20.xml><?xml version="1.0" encoding="utf-8"?>
+<p:notes xmlns:a="http://schemas.openxmlformats.org/drawingml/2006/main" xmlns:r="http://schemas.openxmlformats.org/officeDocument/2006/relationships" xmlns:p="http://schemas.openxmlformats.org/presentationml/2006/main">
+  <p:cSld>
+    <p:spTree>
+      <p:nvGrpSpPr>
+        <p:cNvPr id="1" name=""/>
+        <p:cNvGrpSpPr/>
+        <p:nvPr/>
+      </p:nvGrpSpPr>
+      <p:grpSpPr>
+        <a:xfrm>
+          <a:off x="0" y="0"/>
+          <a:ext cx="0" cy="0"/>
+          <a:chOff x="0" y="0"/>
+          <a:chExt cx="0" cy="0"/>
+        </a:xfrm>
+      </p:grpSpPr>
+      <p:sp>
+        <p:nvSpPr>
+          <p:cNvPr id="2" name="Slide Image Placeholder 1"/>
+          <p:cNvSpPr>
+            <a:spLocks noGrp="1" noRot="1" noChangeAspect="1"/>
+          </p:cNvSpPr>
+          <p:nvPr>
+            <p:ph type="sldImg"/>
+          </p:nvPr>
+        </p:nvSpPr>
+        <p:spPr/>
+      </p:sp>
+      <p:sp>
+        <p:nvSpPr>
+          <p:cNvPr id="3" name="Notes Placeholder 2"/>
+          <p:cNvSpPr>
+            <a:spLocks noGrp="1"/>
+          </p:cNvSpPr>
+          <p:nvPr>
+            <p:ph type="body" idx="1"/>
+          </p:nvPr>
+        </p:nvSpPr>
+        <p:spPr/>
+        <p:txBody>
+          <a:bodyPr>
+            <a:normAutofit/>
+          </a:bodyPr>
+          <a:lstStyle/>
+          <a:p>
+            <a:pPr marL="228600" marR="0" indent="-228600" algn="l" defTabSz="914400" rtl="0" eaLnBrk="1" fontAlgn="auto" latinLnBrk="0" hangingPunct="1">
+              <a:lnSpc>
+                <a:spcPct val="100000"/>
+              </a:lnSpc>
+              <a:spcBef>
+                <a:spcPts val="0"/>
+              </a:spcBef>
+              <a:spcAft>
+                <a:spcPts val="0"/>
+              </a:spcAft>
+              <a:buClrTx/>
+              <a:buSzTx/>
+              <a:buFontTx/>
+              <a:buAutoNum type="arabicPeriod"/>
+              <a:tabLst/>
+              <a:defRPr/>
+            </a:pPr>
+            <a:r>
+              <a:rPr lang="en-US" baseline="0" smtClean="0"/>
+              <a:t>Questions?</a:t>
+            </a:r>
+            <a:endParaRPr lang="en-US" baseline="0" dirty="0" smtClean="0"/>
+          </a:p>
+        </p:txBody>
+      </p:sp>
+      <p:sp>
+        <p:nvSpPr>
+          <p:cNvPr id="4" name="Slide Number Placeholder 3"/>
+          <p:cNvSpPr>
+            <a:spLocks noGrp="1"/>
+          </p:cNvSpPr>
+          <p:nvPr>
+            <p:ph type="sldNum" sz="quarter" idx="10"/>
+          </p:nvPr>
+        </p:nvSpPr>
+        <p:spPr/>
+        <p:txBody>
+          <a:bodyPr/>
+          <a:lstStyle/>
+          <a:p>
+            <a:fld id="{D55A58F0-34EB-4AC8-8F16-CAEFD6BDFC59}" type="slidenum">
+              <a:rPr lang="en-US" smtClean="0"/>
+              <a:pPr/>
+              <a:t>20</a:t>
+            </a:fld>
+            <a:endParaRPr lang="en-US"/>
+          </a:p>
+        </p:txBody>
+      </p:sp>
+    </p:spTree>
+  </p:cSld>
+  <p:clrMapOvr>
+    <a:masterClrMapping/>
+  </p:clrMapOvr>
+</p:notes>
+</file>
+
 <file path=ppt/notesSlides/notesSlide3.xml><?xml version="1.0" encoding="utf-8"?>
 <p:notes xmlns:a="http://schemas.openxmlformats.org/drawingml/2006/main" xmlns:r="http://schemas.openxmlformats.org/officeDocument/2006/relationships" xmlns:p="http://schemas.openxmlformats.org/presentationml/2006/main">
   <p:cSld>
@@ -2286,7 +2483,6 @@
               <a:rPr lang="en-US" baseline="0" dirty="0" smtClean="0"/>
               <a:t>High barrier of entry to asp.net developers (no server side controls)</a:t>
             </a:r>
-            <a:endParaRPr lang="en-US" baseline="0" dirty="0" smtClean="0"/>
           </a:p>
           <a:p>
             <a:r>
@@ -2787,7 +2983,6 @@
               <a:rPr lang="en-US" baseline="0" dirty="0" smtClean="0"/>
               <a:t>Add new AJAX enabled site</a:t>
             </a:r>
-            <a:endParaRPr lang="en-US" baseline="0" dirty="0" smtClean="0"/>
           </a:p>
         </p:txBody>
       </p:sp>
@@ -3034,23 +3229,11 @@
             </a:pPr>
             <a:r>
               <a:rPr lang="en-US" dirty="0" smtClean="0"/>
-              <a:t>Partial </a:t>
-            </a:r>
-            <a:r>
-              <a:rPr lang="en-US" dirty="0" smtClean="0"/>
-              <a:t>rendering –</a:t>
+              <a:t>Partial rendering –</a:t>
             </a:r>
             <a:r>
               <a:rPr lang="en-US" baseline="0" dirty="0" smtClean="0"/>
-              <a:t> “Atlas” was set to false by default. </a:t>
-            </a:r>
-            <a:r>
-              <a:rPr lang="en-US" baseline="0" dirty="0" smtClean="0"/>
-              <a:t>Magic needed </a:t>
-            </a:r>
-            <a:r>
-              <a:rPr lang="en-US" baseline="0" dirty="0" smtClean="0"/>
-              <a:t>for update panels to work asynchronously</a:t>
+              <a:t> “Atlas” was set to false by default. Magic needed for update panels to work asynchronously</a:t>
             </a:r>
           </a:p>
           <a:p>
@@ -3101,11 +3284,7 @@
             </a:r>
             <a:r>
               <a:rPr lang="en-US" baseline="0" dirty="0" smtClean="0"/>
-              <a:t> </a:t>
-            </a:r>
-            <a:r>
-              <a:rPr lang="en-US" baseline="0" dirty="0" smtClean="0"/>
-              <a:t>error message – catch all message. Quick and dirty way to clean up error messages.</a:t>
+              <a:t> error message – catch all message. Quick and dirty way to clean up error messages.</a:t>
             </a:r>
           </a:p>
           <a:p>
@@ -3271,11 +3450,7 @@
             </a:r>
             <a:r>
               <a:rPr lang="en-US" baseline="0" dirty="0" smtClean="0"/>
-              <a:t> </a:t>
-            </a:r>
-            <a:r>
-              <a:rPr lang="en-US" baseline="0" dirty="0" smtClean="0"/>
-              <a:t>and </a:t>
+              <a:t> and </a:t>
             </a:r>
             <a:r>
               <a:rPr lang="en-US" baseline="0" dirty="0" err="1" smtClean="0"/>
@@ -3413,7 +3588,7 @@
             <a:fld id="{06C54696-270C-4914-A8D7-D187CB4A52BE}" type="datetimeFigureOut">
               <a:rPr lang="en-US" smtClean="0"/>
               <a:pPr/>
-              <a:t>4/12/2008</a:t>
+              <a:t>4/15/2008</a:t>
             </a:fld>
             <a:endParaRPr lang="en-US"/>
           </a:p>
@@ -4132,7 +4307,7 @@
             <a:fld id="{06C54696-270C-4914-A8D7-D187CB4A52BE}" type="datetimeFigureOut">
               <a:rPr lang="en-US" smtClean="0"/>
               <a:pPr/>
-              <a:t>4/12/2008</a:t>
+              <a:t>4/15/2008</a:t>
             </a:fld>
             <a:endParaRPr lang="en-US"/>
           </a:p>
@@ -4319,7 +4494,7 @@
             <a:fld id="{06C54696-270C-4914-A8D7-D187CB4A52BE}" type="datetimeFigureOut">
               <a:rPr lang="en-US" smtClean="0"/>
               <a:pPr/>
-              <a:t>4/12/2008</a:t>
+              <a:t>4/15/2008</a:t>
             </a:fld>
             <a:endParaRPr lang="en-US"/>
           </a:p>
@@ -4496,7 +4671,7 @@
             <a:fld id="{06C54696-270C-4914-A8D7-D187CB4A52BE}" type="datetimeFigureOut">
               <a:rPr lang="en-US" smtClean="0"/>
               <a:pPr/>
-              <a:t>4/12/2008</a:t>
+              <a:t>4/15/2008</a:t>
             </a:fld>
             <a:endParaRPr lang="en-US"/>
           </a:p>
@@ -5981,7 +6156,7 @@
             <a:fld id="{06C54696-270C-4914-A8D7-D187CB4A52BE}" type="datetimeFigureOut">
               <a:rPr lang="en-US" smtClean="0"/>
               <a:pPr/>
-              <a:t>4/12/2008</a:t>
+              <a:t>4/15/2008</a:t>
             </a:fld>
             <a:endParaRPr lang="en-US"/>
           </a:p>
@@ -6583,7 +6758,7 @@
             <a:fld id="{06C54696-270C-4914-A8D7-D187CB4A52BE}" type="datetimeFigureOut">
               <a:rPr lang="en-US" smtClean="0"/>
               <a:pPr/>
-              <a:t>4/12/2008</a:t>
+              <a:t>4/15/2008</a:t>
             </a:fld>
             <a:endParaRPr lang="en-US"/>
           </a:p>
@@ -7022,7 +7197,7 @@
             <a:fld id="{06C54696-270C-4914-A8D7-D187CB4A52BE}" type="datetimeFigureOut">
               <a:rPr lang="en-US" smtClean="0"/>
               <a:pPr/>
-              <a:t>4/12/2008</a:t>
+              <a:t>4/15/2008</a:t>
             </a:fld>
             <a:endParaRPr lang="en-US"/>
           </a:p>
@@ -7585,7 +7760,7 @@
             <a:fld id="{06C54696-270C-4914-A8D7-D187CB4A52BE}" type="datetimeFigureOut">
               <a:rPr lang="en-US" smtClean="0"/>
               <a:pPr/>
-              <a:t>4/12/2008</a:t>
+              <a:t>4/15/2008</a:t>
             </a:fld>
             <a:endParaRPr lang="en-US"/>
           </a:p>
@@ -7683,7 +7858,7 @@
             <a:fld id="{06C54696-270C-4914-A8D7-D187CB4A52BE}" type="datetimeFigureOut">
               <a:rPr lang="en-US" smtClean="0"/>
               <a:pPr/>
-              <a:t>4/12/2008</a:t>
+              <a:t>4/15/2008</a:t>
             </a:fld>
             <a:endParaRPr lang="en-US"/>
           </a:p>
@@ -7939,7 +8114,7 @@
             <a:fld id="{06C54696-270C-4914-A8D7-D187CB4A52BE}" type="datetimeFigureOut">
               <a:rPr lang="en-US" smtClean="0"/>
               <a:pPr/>
-              <a:t>4/12/2008</a:t>
+              <a:t>4/15/2008</a:t>
             </a:fld>
             <a:endParaRPr lang="en-US"/>
           </a:p>
@@ -8662,7 +8837,7 @@
             <a:fld id="{06C54696-270C-4914-A8D7-D187CB4A52BE}" type="datetimeFigureOut">
               <a:rPr lang="en-US" smtClean="0"/>
               <a:pPr/>
-              <a:t>4/12/2008</a:t>
+              <a:t>4/15/2008</a:t>
             </a:fld>
             <a:endParaRPr lang="en-US"/>
           </a:p>
@@ -9337,7 +9512,7 @@
             <a:fld id="{06C54696-270C-4914-A8D7-D187CB4A52BE}" type="datetimeFigureOut">
               <a:rPr lang="en-US" smtClean="0"/>
               <a:pPr/>
-              <a:t>4/12/2008</a:t>
+              <a:t>4/15/2008</a:t>
             </a:fld>
             <a:endParaRPr lang="en-US"/>
           </a:p>
@@ -9850,11 +10025,7 @@
             <a:pPr algn="ctr"/>
             <a:r>
               <a:rPr lang="en-US" dirty="0" smtClean="0"/>
-              <a:t>Update Panel </a:t>
-            </a:r>
-            <a:r>
-              <a:rPr lang="en-US" dirty="0" smtClean="0"/>
-              <a:t>Pros</a:t>
+              <a:t>Update Panel Pros</a:t>
             </a:r>
             <a:endParaRPr lang="en-US" dirty="0"/>
           </a:p>
@@ -9948,11 +10119,7 @@
             <a:pPr algn="ctr"/>
             <a:r>
               <a:rPr lang="en-US" dirty="0" smtClean="0"/>
-              <a:t>Update Panel </a:t>
-            </a:r>
-            <a:r>
-              <a:rPr lang="en-US" dirty="0" smtClean="0"/>
-              <a:t>Cons</a:t>
+              <a:t>Update Panel Cons</a:t>
             </a:r>
             <a:endParaRPr lang="en-US" dirty="0"/>
           </a:p>
@@ -10732,6 +10899,78 @@
       </p:grpSpPr>
       <p:sp>
         <p:nvSpPr>
+          <p:cNvPr id="2" name="Title 1"/>
+          <p:cNvSpPr>
+            <a:spLocks noGrp="1"/>
+          </p:cNvSpPr>
+          <p:nvPr>
+            <p:ph type="title"/>
+          </p:nvPr>
+        </p:nvSpPr>
+        <p:spPr>
+          <a:xfrm>
+            <a:off x="914400" y="2819400"/>
+            <a:ext cx="7772400" cy="1447800"/>
+          </a:xfrm>
+        </p:spPr>
+        <p:txBody>
+          <a:bodyPr/>
+          <a:lstStyle/>
+          <a:p>
+            <a:r>
+              <a:rPr lang="en-US" sz="6000" dirty="0" smtClean="0">
+                <a:solidFill>
+                  <a:srgbClr val="FFC000"/>
+                </a:solidFill>
+                <a:latin typeface="Courier New" pitchFamily="49" charset="0"/>
+                <a:cs typeface="Courier New" pitchFamily="49" charset="0"/>
+              </a:rPr>
+              <a:t>&lt;code /&gt;</a:t>
+            </a:r>
+            <a:endParaRPr lang="en-US" sz="6000" dirty="0">
+              <a:solidFill>
+                <a:srgbClr val="FFC000"/>
+              </a:solidFill>
+              <a:latin typeface="Courier New" pitchFamily="49" charset="0"/>
+              <a:cs typeface="Courier New" pitchFamily="49" charset="0"/>
+            </a:endParaRPr>
+          </a:p>
+        </p:txBody>
+      </p:sp>
+    </p:spTree>
+  </p:cSld>
+  <p:clrMapOvr>
+    <a:masterClrMapping/>
+  </p:clrMapOvr>
+  <p:timing>
+    <p:tnLst>
+      <p:par>
+        <p:cTn id="1" dur="indefinite" restart="never" nodeType="tmRoot"/>
+      </p:par>
+    </p:tnLst>
+  </p:timing>
+</p:sld>
+</file>
+
+<file path=ppt/slides/slide15.xml><?xml version="1.0" encoding="utf-8"?>
+<p:sld xmlns:a="http://schemas.openxmlformats.org/drawingml/2006/main" xmlns:r="http://schemas.openxmlformats.org/officeDocument/2006/relationships" xmlns:p="http://schemas.openxmlformats.org/presentationml/2006/main" showMasterSp="0">
+  <p:cSld>
+    <p:spTree>
+      <p:nvGrpSpPr>
+        <p:cNvPr id="1" name=""/>
+        <p:cNvGrpSpPr/>
+        <p:nvPr/>
+      </p:nvGrpSpPr>
+      <p:grpSpPr>
+        <a:xfrm>
+          <a:off x="0" y="0"/>
+          <a:ext cx="0" cy="0"/>
+          <a:chOff x="0" y="0"/>
+          <a:chExt cx="0" cy="0"/>
+        </a:xfrm>
+      </p:grpSpPr>
+      <p:sp>
+        <p:nvSpPr>
           <p:cNvPr id="4" name="Title 3"/>
           <p:cNvSpPr>
             <a:spLocks noGrp="1"/>
@@ -11387,7 +11626,7 @@
 </p:sld>
 </file>
 
-<file path=ppt/slides/slide15.xml><?xml version="1.0" encoding="utf-8"?>
+<file path=ppt/slides/slide16.xml><?xml version="1.0" encoding="utf-8"?>
 <p:sld xmlns:a="http://schemas.openxmlformats.org/drawingml/2006/main" xmlns:r="http://schemas.openxmlformats.org/officeDocument/2006/relationships" xmlns:p="http://schemas.openxmlformats.org/presentationml/2006/main" showMasterSp="0">
   <p:cSld>
     <p:spTree>
@@ -11427,11 +11666,7 @@
             <a:pPr algn="ctr"/>
             <a:r>
               <a:rPr lang="en-US" dirty="0" smtClean="0"/>
-              <a:t>Callback </a:t>
-            </a:r>
-            <a:r>
-              <a:rPr lang="en-US" dirty="0" smtClean="0"/>
-              <a:t>Pros</a:t>
+              <a:t>Callback Pros</a:t>
             </a:r>
             <a:endParaRPr lang="en-US" dirty="0"/>
           </a:p>
@@ -11483,7 +11718,7 @@
 </p:sld>
 </file>
 
-<file path=ppt/slides/slide16.xml><?xml version="1.0" encoding="utf-8"?>
+<file path=ppt/slides/slide17.xml><?xml version="1.0" encoding="utf-8"?>
 <p:sld xmlns:a="http://schemas.openxmlformats.org/drawingml/2006/main" xmlns:r="http://schemas.openxmlformats.org/officeDocument/2006/relationships" xmlns:p="http://schemas.openxmlformats.org/presentationml/2006/main" showMasterSp="0">
   <p:cSld>
     <p:spTree>
@@ -11523,11 +11758,7 @@
             <a:pPr algn="ctr"/>
             <a:r>
               <a:rPr lang="en-US" dirty="0" smtClean="0"/>
-              <a:t>Callback </a:t>
-            </a:r>
-            <a:r>
-              <a:rPr lang="en-US" dirty="0" smtClean="0"/>
-              <a:t>Cons</a:t>
+              <a:t>Callback Cons</a:t>
             </a:r>
             <a:endParaRPr lang="en-US" dirty="0"/>
           </a:p>
@@ -11579,150 +11810,6 @@
 </p:sld>
 </file>
 
-<file path=ppt/slides/slide17.xml><?xml version="1.0" encoding="utf-8"?>
-<p:sld xmlns:a="http://schemas.openxmlformats.org/drawingml/2006/main" xmlns:r="http://schemas.openxmlformats.org/officeDocument/2006/relationships" xmlns:p="http://schemas.openxmlformats.org/presentationml/2006/main" showMasterSp="0">
-  <p:cSld>
-    <p:spTree>
-      <p:nvGrpSpPr>
-        <p:cNvPr id="1" name=""/>
-        <p:cNvGrpSpPr/>
-        <p:nvPr/>
-      </p:nvGrpSpPr>
-      <p:grpSpPr>
-        <a:xfrm>
-          <a:off x="0" y="0"/>
-          <a:ext cx="0" cy="0"/>
-          <a:chOff x="0" y="0"/>
-          <a:chExt cx="0" cy="0"/>
-        </a:xfrm>
-      </p:grpSpPr>
-      <p:sp>
-        <p:nvSpPr>
-          <p:cNvPr id="2" name="Title 1"/>
-          <p:cNvSpPr>
-            <a:spLocks noGrp="1"/>
-          </p:cNvSpPr>
-          <p:nvPr>
-            <p:ph type="title"/>
-          </p:nvPr>
-        </p:nvSpPr>
-        <p:spPr/>
-        <p:txBody>
-          <a:bodyPr/>
-          <a:lstStyle/>
-          <a:p>
-            <a:r>
-              <a:rPr lang="en-US" dirty="0" smtClean="0"/>
-              <a:t>Resources</a:t>
-            </a:r>
-            <a:endParaRPr lang="en-US" dirty="0"/>
-          </a:p>
-        </p:txBody>
-      </p:sp>
-      <p:sp>
-        <p:nvSpPr>
-          <p:cNvPr id="3" name="Content Placeholder 2"/>
-          <p:cNvSpPr>
-            <a:spLocks noGrp="1"/>
-          </p:cNvSpPr>
-          <p:nvPr>
-            <p:ph idx="1"/>
-          </p:nvPr>
-        </p:nvSpPr>
-        <p:spPr/>
-        <p:txBody>
-          <a:bodyPr/>
-          <a:lstStyle/>
-          <a:p>
-            <a:r>
-              <a:rPr lang="en-US" dirty="0" smtClean="0"/>
-              <a:t>Microsoft AJAX libraries: ajax.asp.net</a:t>
-            </a:r>
-          </a:p>
-          <a:p>
-            <a:r>
-              <a:rPr lang="en-US" dirty="0" smtClean="0"/>
-              <a:t>Toolkit: asp.net/</a:t>
-            </a:r>
-            <a:r>
-              <a:rPr lang="en-US" dirty="0" err="1" smtClean="0"/>
-              <a:t>ajax</a:t>
-            </a:r>
-            <a:r>
-              <a:rPr lang="en-US" dirty="0" smtClean="0"/>
-              <a:t>/</a:t>
-            </a:r>
-            <a:r>
-              <a:rPr lang="en-US" dirty="0" err="1" smtClean="0"/>
-              <a:t>ajaxcontroltoolkit</a:t>
-            </a:r>
-            <a:r>
-              <a:rPr lang="en-US" dirty="0" smtClean="0"/>
-              <a:t>/</a:t>
-            </a:r>
-          </a:p>
-          <a:p>
-            <a:r>
-              <a:rPr lang="en-US" dirty="0" smtClean="0"/>
-              <a:t>Scott Guthrie: weblogs.asp.net/</a:t>
-            </a:r>
-            <a:r>
-              <a:rPr lang="en-US" dirty="0" err="1" smtClean="0"/>
-              <a:t>scottgu</a:t>
-            </a:r>
-            <a:r>
-              <a:rPr lang="en-US" dirty="0" smtClean="0"/>
-              <a:t>/</a:t>
-            </a:r>
-          </a:p>
-          <a:p>
-            <a:r>
-              <a:rPr lang="en-US" dirty="0" smtClean="0"/>
-              <a:t>Matt </a:t>
-            </a:r>
-            <a:r>
-              <a:rPr lang="en-US" dirty="0" err="1" smtClean="0"/>
-              <a:t>Berseth</a:t>
-            </a:r>
-            <a:r>
-              <a:rPr lang="en-US" dirty="0" smtClean="0"/>
-              <a:t>: mattberseth.com</a:t>
-            </a:r>
-          </a:p>
-          <a:p>
-            <a:r>
-              <a:rPr lang="en-US" dirty="0" smtClean="0"/>
-              <a:t>David Hayden: davidhayden.com/blog/</a:t>
-            </a:r>
-            <a:r>
-              <a:rPr lang="en-US" dirty="0" err="1" smtClean="0"/>
-              <a:t>dave</a:t>
-            </a:r>
-            <a:r>
-              <a:rPr lang="en-US" dirty="0" smtClean="0"/>
-              <a:t>/</a:t>
-            </a:r>
-          </a:p>
-          <a:p>
-            <a:endParaRPr lang="en-US" dirty="0"/>
-          </a:p>
-        </p:txBody>
-      </p:sp>
-    </p:spTree>
-  </p:cSld>
-  <p:clrMapOvr>
-    <a:masterClrMapping/>
-  </p:clrMapOvr>
-  <p:timing>
-    <p:tnLst>
-      <p:par>
-        <p:cTn id="1" dur="indefinite" restart="never" nodeType="tmRoot"/>
-      </p:par>
-    </p:tnLst>
-  </p:timing>
-</p:sld>
-</file>
-
 <file path=ppt/slides/slide18.xml><?xml version="1.0" encoding="utf-8"?>
 <p:sld xmlns:a="http://schemas.openxmlformats.org/drawingml/2006/main" xmlns:r="http://schemas.openxmlformats.org/officeDocument/2006/relationships" xmlns:p="http://schemas.openxmlformats.org/presentationml/2006/main" showMasterSp="0">
   <p:cSld>
@@ -11750,14 +11837,86 @@
             <p:ph type="title"/>
           </p:nvPr>
         </p:nvSpPr>
-        <p:spPr/>
+        <p:spPr>
+          <a:xfrm>
+            <a:off x="914400" y="2819400"/>
+            <a:ext cx="7772400" cy="1447800"/>
+          </a:xfrm>
+        </p:spPr>
         <p:txBody>
           <a:bodyPr/>
           <a:lstStyle/>
           <a:p>
             <a:r>
+              <a:rPr lang="en-US" sz="6000" dirty="0" smtClean="0">
+                <a:solidFill>
+                  <a:srgbClr val="FFC000"/>
+                </a:solidFill>
+                <a:latin typeface="Courier New" pitchFamily="49" charset="0"/>
+                <a:cs typeface="Courier New" pitchFamily="49" charset="0"/>
+              </a:rPr>
+              <a:t>&lt;code /&gt;</a:t>
+            </a:r>
+            <a:endParaRPr lang="en-US" sz="6000" dirty="0">
+              <a:solidFill>
+                <a:srgbClr val="FFC000"/>
+              </a:solidFill>
+              <a:latin typeface="Courier New" pitchFamily="49" charset="0"/>
+              <a:cs typeface="Courier New" pitchFamily="49" charset="0"/>
+            </a:endParaRPr>
+          </a:p>
+        </p:txBody>
+      </p:sp>
+    </p:spTree>
+  </p:cSld>
+  <p:clrMapOvr>
+    <a:masterClrMapping/>
+  </p:clrMapOvr>
+  <p:timing>
+    <p:tnLst>
+      <p:par>
+        <p:cTn id="1" dur="indefinite" restart="never" nodeType="tmRoot"/>
+      </p:par>
+    </p:tnLst>
+  </p:timing>
+</p:sld>
+</file>
+
+<file path=ppt/slides/slide19.xml><?xml version="1.0" encoding="utf-8"?>
+<p:sld xmlns:a="http://schemas.openxmlformats.org/drawingml/2006/main" xmlns:r="http://schemas.openxmlformats.org/officeDocument/2006/relationships" xmlns:p="http://schemas.openxmlformats.org/presentationml/2006/main" showMasterSp="0">
+  <p:cSld>
+    <p:spTree>
+      <p:nvGrpSpPr>
+        <p:cNvPr id="1" name=""/>
+        <p:cNvGrpSpPr/>
+        <p:nvPr/>
+      </p:nvGrpSpPr>
+      <p:grpSpPr>
+        <a:xfrm>
+          <a:off x="0" y="0"/>
+          <a:ext cx="0" cy="0"/>
+          <a:chOff x="0" y="0"/>
+          <a:chExt cx="0" cy="0"/>
+        </a:xfrm>
+      </p:grpSpPr>
+      <p:sp>
+        <p:nvSpPr>
+          <p:cNvPr id="2" name="Title 1"/>
+          <p:cNvSpPr>
+            <a:spLocks noGrp="1"/>
+          </p:cNvSpPr>
+          <p:nvPr>
+            <p:ph type="title"/>
+          </p:nvPr>
+        </p:nvSpPr>
+        <p:spPr/>
+        <p:txBody>
+          <a:bodyPr/>
+          <a:lstStyle/>
+          <a:p>
+            <a:r>
               <a:rPr lang="en-US" dirty="0" smtClean="0"/>
-              <a:t>Tim Wingfield</a:t>
+              <a:t>Resources</a:t>
             </a:r>
             <a:endParaRPr lang="en-US" dirty="0"/>
           </a:p>
@@ -11775,43 +11934,80 @@
         </p:nvSpPr>
         <p:spPr/>
         <p:txBody>
-          <a:bodyPr>
-            <a:normAutofit/>
-          </a:bodyPr>
+          <a:bodyPr/>
           <a:lstStyle/>
           <a:p>
             <a:r>
-              <a:rPr lang="en-US" sz="2800" dirty="0" smtClean="0"/>
-              <a:t>Email: </a:t>
-            </a:r>
-            <a:r>
-              <a:rPr lang="en-US" sz="2800" dirty="0" smtClean="0">
-                <a:hlinkClick r:id="rId3"/>
-              </a:rPr>
-              <a:t>tim@timwingfield.com</a:t>
-            </a:r>
-            <a:endParaRPr lang="en-US" sz="2800" dirty="0" smtClean="0"/>
-          </a:p>
-          <a:p>
-            <a:r>
-              <a:rPr lang="en-US" sz="2800" dirty="0" smtClean="0"/>
-              <a:t>Blog: </a:t>
-            </a:r>
-            <a:r>
-              <a:rPr lang="en-US" sz="2800" dirty="0" smtClean="0"/>
-              <a:t>blog.timwingfield.com</a:t>
-            </a:r>
-          </a:p>
-          <a:p>
-            <a:r>
-              <a:rPr lang="en-US" sz="2800" dirty="0" smtClean="0"/>
-              <a:t>Twitter: </a:t>
-            </a:r>
-            <a:r>
-              <a:rPr lang="en-US" sz="2800" dirty="0" err="1" smtClean="0"/>
-              <a:t>timwingfield</a:t>
-            </a:r>
-            <a:endParaRPr lang="en-US" sz="2800" dirty="0" smtClean="0"/>
+              <a:rPr lang="en-US" dirty="0" smtClean="0"/>
+              <a:t>Microsoft AJAX libraries: ajax.asp.net</a:t>
+            </a:r>
+          </a:p>
+          <a:p>
+            <a:r>
+              <a:rPr lang="en-US" dirty="0" smtClean="0"/>
+              <a:t>Toolkit: asp.net/</a:t>
+            </a:r>
+            <a:r>
+              <a:rPr lang="en-US" dirty="0" err="1" smtClean="0"/>
+              <a:t>ajax</a:t>
+            </a:r>
+            <a:r>
+              <a:rPr lang="en-US" dirty="0" smtClean="0"/>
+              <a:t>/</a:t>
+            </a:r>
+            <a:r>
+              <a:rPr lang="en-US" dirty="0" err="1" smtClean="0"/>
+              <a:t>ajaxcontroltoolkit</a:t>
+            </a:r>
+            <a:r>
+              <a:rPr lang="en-US" dirty="0" smtClean="0"/>
+              <a:t>/</a:t>
+            </a:r>
+          </a:p>
+          <a:p>
+            <a:r>
+              <a:rPr lang="en-US" dirty="0" smtClean="0"/>
+              <a:t>Scott Guthrie: weblogs.asp.net/</a:t>
+            </a:r>
+            <a:r>
+              <a:rPr lang="en-US" dirty="0" err="1" smtClean="0"/>
+              <a:t>scottgu</a:t>
+            </a:r>
+            <a:r>
+              <a:rPr lang="en-US" dirty="0" smtClean="0"/>
+              <a:t>/</a:t>
+            </a:r>
+          </a:p>
+          <a:p>
+            <a:r>
+              <a:rPr lang="en-US" dirty="0" smtClean="0"/>
+              <a:t>Matt </a:t>
+            </a:r>
+            <a:r>
+              <a:rPr lang="en-US" dirty="0" err="1" smtClean="0"/>
+              <a:t>Berseth</a:t>
+            </a:r>
+            <a:r>
+              <a:rPr lang="en-US" dirty="0" smtClean="0"/>
+              <a:t>: mattberseth.com</a:t>
+            </a:r>
+          </a:p>
+          <a:p>
+            <a:r>
+              <a:rPr lang="en-US" dirty="0" smtClean="0"/>
+              <a:t>David Hayden: davidhayden.com/blog/</a:t>
+            </a:r>
+            <a:r>
+              <a:rPr lang="en-US" dirty="0" err="1" smtClean="0"/>
+              <a:t>dave</a:t>
+            </a:r>
+            <a:r>
+              <a:rPr lang="en-US" dirty="0" smtClean="0"/>
+              <a:t>/</a:t>
+            </a:r>
+          </a:p>
+          <a:p>
+            <a:endParaRPr lang="en-US" dirty="0"/>
           </a:p>
         </p:txBody>
       </p:sp>
@@ -12327,6 +12523,109 @@
 </p:sld>
 </file>
 
+<file path=ppt/slides/slide20.xml><?xml version="1.0" encoding="utf-8"?>
+<p:sld xmlns:a="http://schemas.openxmlformats.org/drawingml/2006/main" xmlns:r="http://schemas.openxmlformats.org/officeDocument/2006/relationships" xmlns:p="http://schemas.openxmlformats.org/presentationml/2006/main" showMasterSp="0">
+  <p:cSld>
+    <p:spTree>
+      <p:nvGrpSpPr>
+        <p:cNvPr id="1" name=""/>
+        <p:cNvGrpSpPr/>
+        <p:nvPr/>
+      </p:nvGrpSpPr>
+      <p:grpSpPr>
+        <a:xfrm>
+          <a:off x="0" y="0"/>
+          <a:ext cx="0" cy="0"/>
+          <a:chOff x="0" y="0"/>
+          <a:chExt cx="0" cy="0"/>
+        </a:xfrm>
+      </p:grpSpPr>
+      <p:sp>
+        <p:nvSpPr>
+          <p:cNvPr id="2" name="Title 1"/>
+          <p:cNvSpPr>
+            <a:spLocks noGrp="1"/>
+          </p:cNvSpPr>
+          <p:nvPr>
+            <p:ph type="title"/>
+          </p:nvPr>
+        </p:nvSpPr>
+        <p:spPr/>
+        <p:txBody>
+          <a:bodyPr/>
+          <a:lstStyle/>
+          <a:p>
+            <a:r>
+              <a:rPr lang="en-US" dirty="0" smtClean="0"/>
+              <a:t>Tim Wingfield</a:t>
+            </a:r>
+            <a:endParaRPr lang="en-US" dirty="0"/>
+          </a:p>
+        </p:txBody>
+      </p:sp>
+      <p:sp>
+        <p:nvSpPr>
+          <p:cNvPr id="3" name="Content Placeholder 2"/>
+          <p:cNvSpPr>
+            <a:spLocks noGrp="1"/>
+          </p:cNvSpPr>
+          <p:nvPr>
+            <p:ph idx="1"/>
+          </p:nvPr>
+        </p:nvSpPr>
+        <p:spPr/>
+        <p:txBody>
+          <a:bodyPr>
+            <a:normAutofit/>
+          </a:bodyPr>
+          <a:lstStyle/>
+          <a:p>
+            <a:r>
+              <a:rPr lang="en-US" sz="2800" dirty="0" smtClean="0"/>
+              <a:t>Email: </a:t>
+            </a:r>
+            <a:r>
+              <a:rPr lang="en-US" sz="2800" dirty="0" smtClean="0">
+                <a:hlinkClick r:id="rId3"/>
+              </a:rPr>
+              <a:t>tim@timwingfield.com</a:t>
+            </a:r>
+            <a:endParaRPr lang="en-US" sz="2800" dirty="0" smtClean="0"/>
+          </a:p>
+          <a:p>
+            <a:r>
+              <a:rPr lang="en-US" sz="2800" dirty="0" smtClean="0"/>
+              <a:t>Blog: blog.timwingfield.com</a:t>
+            </a:r>
+          </a:p>
+          <a:p>
+            <a:r>
+              <a:rPr lang="en-US" sz="2800" dirty="0" smtClean="0"/>
+              <a:t>Twitter: </a:t>
+            </a:r>
+            <a:r>
+              <a:rPr lang="en-US" sz="2800" dirty="0" err="1" smtClean="0"/>
+              <a:t>timwingfield</a:t>
+            </a:r>
+            <a:endParaRPr lang="en-US" sz="2800" dirty="0" smtClean="0"/>
+          </a:p>
+        </p:txBody>
+      </p:sp>
+    </p:spTree>
+  </p:cSld>
+  <p:clrMapOvr>
+    <a:masterClrMapping/>
+  </p:clrMapOvr>
+  <p:timing>
+    <p:tnLst>
+      <p:par>
+        <p:cTn id="1" dur="indefinite" restart="never" nodeType="tmRoot"/>
+      </p:par>
+    </p:tnLst>
+  </p:timing>
+</p:sld>
+</file>
+
 <file path=ppt/slides/slide3.xml><?xml version="1.0" encoding="utf-8"?>
 <p:sld xmlns:a="http://schemas.openxmlformats.org/drawingml/2006/main" xmlns:r="http://schemas.openxmlformats.org/officeDocument/2006/relationships" xmlns:p="http://schemas.openxmlformats.org/presentationml/2006/main" showMasterSp="0">
   <p:cSld>
@@ -12944,11 +13243,7 @@
           <a:p>
             <a:r>
               <a:rPr lang="en-US" dirty="0" smtClean="0"/>
-              <a:t>In </a:t>
-            </a:r>
-            <a:r>
-              <a:rPr lang="en-US" dirty="0" smtClean="0"/>
-              <a:t>Visual Studio add a new 	</a:t>
+              <a:t>In Visual Studio add a new 	</a:t>
             </a:r>
             <a:r>
               <a:rPr lang="en-US" dirty="0" err="1" smtClean="0"/>
@@ -13198,13 +13493,6 @@
               </a:rPr>
               <a:t> </a:t>
             </a:r>
-            <a:endParaRPr lang="en-US" sz="3200" dirty="0" smtClean="0">
-              <a:solidFill>
-                <a:srgbClr val="800000"/>
-              </a:solidFill>
-              <a:latin typeface="Courier New" pitchFamily="49" charset="0"/>
-              <a:cs typeface="Courier New" pitchFamily="49" charset="0"/>
-            </a:endParaRPr>
           </a:p>
           <a:p>
             <a:pPr>
@@ -13241,27 +13529,7 @@
                 <a:latin typeface="Courier New" pitchFamily="49" charset="0"/>
                 <a:cs typeface="Courier New" pitchFamily="49" charset="0"/>
               </a:rPr>
-              <a:t>=“ScriptManager1</a:t>
-            </a:r>
-            <a:r>
-              <a:rPr lang="en-US" sz="3200" dirty="0" smtClean="0">
-                <a:solidFill>
-                  <a:srgbClr val="0000FF"/>
-                </a:solidFill>
-                <a:latin typeface="Courier New" pitchFamily="49" charset="0"/>
-                <a:cs typeface="Courier New" pitchFamily="49" charset="0"/>
-              </a:rPr>
-              <a:t>”</a:t>
-            </a:r>
-            <a:r>
-              <a:rPr lang="en-US" sz="3200" dirty="0" smtClean="0">
-                <a:solidFill>
-                  <a:srgbClr val="0000FF"/>
-                </a:solidFill>
-                <a:latin typeface="Courier New" pitchFamily="49" charset="0"/>
-                <a:cs typeface="Courier New" pitchFamily="49" charset="0"/>
-              </a:rPr>
-              <a:t> </a:t>
+              <a:t>=“ScriptManager1” </a:t>
             </a:r>
           </a:p>
           <a:p>
@@ -13299,27 +13567,7 @@
                 <a:latin typeface="Courier New" pitchFamily="49" charset="0"/>
                 <a:cs typeface="Courier New" pitchFamily="49" charset="0"/>
               </a:rPr>
-              <a:t>=“server</a:t>
-            </a:r>
-            <a:r>
-              <a:rPr lang="en-US" sz="3200" dirty="0" smtClean="0">
-                <a:solidFill>
-                  <a:srgbClr val="0000FF"/>
-                </a:solidFill>
-                <a:latin typeface="Courier New" pitchFamily="49" charset="0"/>
-                <a:cs typeface="Courier New" pitchFamily="49" charset="0"/>
-              </a:rPr>
-              <a:t>”</a:t>
-            </a:r>
-            <a:r>
-              <a:rPr lang="en-US" sz="3200" dirty="0" smtClean="0">
-                <a:solidFill>
-                  <a:srgbClr val="0000FF"/>
-                </a:solidFill>
-                <a:latin typeface="Courier New" pitchFamily="49" charset="0"/>
-                <a:cs typeface="Courier New" pitchFamily="49" charset="0"/>
-              </a:rPr>
-              <a:t> </a:t>
+              <a:t>=“server” </a:t>
             </a:r>
           </a:p>
           <a:p>
@@ -13435,13 +13683,6 @@
               </a:rPr>
               <a:t>=“90”</a:t>
             </a:r>
-            <a:endParaRPr lang="en-US" sz="3200" dirty="0" smtClean="0">
-              <a:solidFill>
-                <a:srgbClr val="0000FF"/>
-              </a:solidFill>
-              <a:latin typeface="Courier New" pitchFamily="49" charset="0"/>
-              <a:cs typeface="Courier New" pitchFamily="49" charset="0"/>
-            </a:endParaRPr>
           </a:p>
           <a:p>
             <a:pPr>
@@ -13598,27 +13839,7 @@
                 <a:latin typeface="Courier New" pitchFamily="49" charset="0"/>
                 <a:cs typeface="Courier New" pitchFamily="49" charset="0"/>
               </a:rPr>
-              <a:t>=“UpdatePanel1</a:t>
-            </a:r>
-            <a:r>
-              <a:rPr lang="en-US" sz="3200" dirty="0" smtClean="0">
-                <a:solidFill>
-                  <a:srgbClr val="0000FF"/>
-                </a:solidFill>
-                <a:latin typeface="Courier New" pitchFamily="49" charset="0"/>
-                <a:cs typeface="Courier New" pitchFamily="49" charset="0"/>
-              </a:rPr>
-              <a:t>”</a:t>
-            </a:r>
-            <a:r>
-              <a:rPr lang="en-US" sz="3200" dirty="0" smtClean="0">
-                <a:solidFill>
-                  <a:srgbClr val="0000FF"/>
-                </a:solidFill>
-                <a:latin typeface="Courier New" pitchFamily="49" charset="0"/>
-                <a:cs typeface="Courier New" pitchFamily="49" charset="0"/>
-              </a:rPr>
-              <a:t> </a:t>
+              <a:t>=“UpdatePanel1” </a:t>
             </a:r>
             <a:r>
               <a:rPr lang="en-US" sz="3200" dirty="0" err="1" smtClean="0">
@@ -13638,25 +13859,8 @@
                 <a:latin typeface="Courier New" pitchFamily="49" charset="0"/>
                 <a:cs typeface="Courier New" pitchFamily="49" charset="0"/>
               </a:rPr>
-              <a:t>=“server</a:t>
-            </a:r>
-            <a:r>
-              <a:rPr lang="en-US" sz="3200" dirty="0" smtClean="0">
-                <a:solidFill>
-                  <a:srgbClr val="0000FF"/>
-                </a:solidFill>
-                <a:latin typeface="Courier New" pitchFamily="49" charset="0"/>
-                <a:cs typeface="Courier New" pitchFamily="49" charset="0"/>
-              </a:rPr>
-              <a:t>”</a:t>
-            </a:r>
-            <a:endParaRPr lang="en-US" sz="3200" dirty="0" smtClean="0">
-              <a:solidFill>
-                <a:srgbClr val="0000FF"/>
-              </a:solidFill>
-              <a:latin typeface="Courier New" pitchFamily="49" charset="0"/>
-              <a:cs typeface="Courier New" pitchFamily="49" charset="0"/>
-            </a:endParaRPr>
+              <a:t>=“server”</a:t>
+            </a:r>
           </a:p>
           <a:p>
             <a:pPr>
@@ -13771,13 +13975,6 @@
               </a:rPr>
               <a:t>=“Block”</a:t>
             </a:r>
-            <a:endParaRPr lang="en-US" sz="3200" dirty="0" smtClean="0">
-              <a:solidFill>
-                <a:srgbClr val="0000FF"/>
-              </a:solidFill>
-              <a:latin typeface="Courier New" pitchFamily="49" charset="0"/>
-              <a:cs typeface="Courier New" pitchFamily="49" charset="0"/>
-            </a:endParaRPr>
           </a:p>
           <a:p>
             <a:pPr>

</xml_diff>

<commit_message>
small edits to slide deck
</commit_message>
<xml_diff>
--- a/Samples/Intro-to-asp.net-ajax/Intro ASP.Net AJAX - Slide Deck.pptx
+++ b/Samples/Intro-to-asp.net-ajax/Intro ASP.Net AJAX - Slide Deck.pptx
@@ -5,8 +5,11 @@
     <p:sldMasterId id="2147483780" r:id="rId1"/>
   </p:sldMasterIdLst>
   <p:notesMasterIdLst>
-    <p:notesMasterId r:id="rId22"/>
+    <p:notesMasterId r:id="rId21"/>
   </p:notesMasterIdLst>
+  <p:handoutMasterIdLst>
+    <p:handoutMasterId r:id="rId22"/>
+  </p:handoutMasterIdLst>
   <p:sldIdLst>
     <p:sldId id="256" r:id="rId2"/>
     <p:sldId id="278" r:id="rId3"/>
@@ -25,9 +28,8 @@
     <p:sldId id="264" r:id="rId16"/>
     <p:sldId id="276" r:id="rId17"/>
     <p:sldId id="284" r:id="rId18"/>
-    <p:sldId id="286" r:id="rId19"/>
-    <p:sldId id="274" r:id="rId20"/>
-    <p:sldId id="275" r:id="rId21"/>
+    <p:sldId id="274" r:id="rId19"/>
+    <p:sldId id="275" r:id="rId20"/>
   </p:sldIdLst>
   <p:sldSz cx="9144000" cy="6858000" type="screen4x3"/>
   <p:notesSz cx="6858000" cy="9144000"/>
@@ -127,6 +129,168 @@
     </a:lvl9pPr>
   </p:defaultTextStyle>
 </p:presentation>
+</file>
+
+<file path=ppt/handoutMasters/handoutMaster1.xml><?xml version="1.0" encoding="utf-8"?>
+<p:handoutMaster xmlns:a="http://schemas.openxmlformats.org/drawingml/2006/main" xmlns:r="http://schemas.openxmlformats.org/officeDocument/2006/relationships" xmlns:p="http://schemas.openxmlformats.org/presentationml/2006/main">
+  <p:cSld>
+    <p:bg>
+      <p:bgRef idx="1001">
+        <a:schemeClr val="bg1"/>
+      </p:bgRef>
+    </p:bg>
+    <p:spTree>
+      <p:nvGrpSpPr>
+        <p:cNvPr id="1" name=""/>
+        <p:cNvGrpSpPr/>
+        <p:nvPr/>
+      </p:nvGrpSpPr>
+      <p:grpSpPr>
+        <a:xfrm>
+          <a:off x="0" y="0"/>
+          <a:ext cx="0" cy="0"/>
+          <a:chOff x="0" y="0"/>
+          <a:chExt cx="0" cy="0"/>
+        </a:xfrm>
+      </p:grpSpPr>
+      <p:sp>
+        <p:nvSpPr>
+          <p:cNvPr id="2" name="Header Placeholder 1"/>
+          <p:cNvSpPr>
+            <a:spLocks noGrp="1"/>
+          </p:cNvSpPr>
+          <p:nvPr>
+            <p:ph type="hdr" sz="quarter"/>
+          </p:nvPr>
+        </p:nvSpPr>
+        <p:spPr>
+          <a:xfrm>
+            <a:off x="0" y="0"/>
+            <a:ext cx="2971800" cy="457200"/>
+          </a:xfrm>
+          <a:prstGeom prst="rect">
+            <a:avLst/>
+          </a:prstGeom>
+        </p:spPr>
+        <p:txBody>
+          <a:bodyPr vert="horz" lIns="91440" tIns="45720" rIns="91440" bIns="45720" rtlCol="0"/>
+          <a:lstStyle>
+            <a:lvl1pPr algn="l">
+              <a:defRPr sz="1200"/>
+            </a:lvl1pPr>
+          </a:lstStyle>
+          <a:p>
+            <a:endParaRPr lang="en-US"/>
+          </a:p>
+        </p:txBody>
+      </p:sp>
+      <p:sp>
+        <p:nvSpPr>
+          <p:cNvPr id="3" name="Date Placeholder 2"/>
+          <p:cNvSpPr>
+            <a:spLocks noGrp="1"/>
+          </p:cNvSpPr>
+          <p:nvPr>
+            <p:ph type="dt" sz="quarter" idx="1"/>
+          </p:nvPr>
+        </p:nvSpPr>
+        <p:spPr>
+          <a:xfrm>
+            <a:off x="3884613" y="0"/>
+            <a:ext cx="2971800" cy="457200"/>
+          </a:xfrm>
+          <a:prstGeom prst="rect">
+            <a:avLst/>
+          </a:prstGeom>
+        </p:spPr>
+        <p:txBody>
+          <a:bodyPr vert="horz" lIns="91440" tIns="45720" rIns="91440" bIns="45720" rtlCol="0"/>
+          <a:lstStyle>
+            <a:lvl1pPr algn="r">
+              <a:defRPr sz="1200"/>
+            </a:lvl1pPr>
+          </a:lstStyle>
+          <a:p>
+            <a:fld id="{8A951ADC-051B-418C-A100-DFBFED9DCAF8}" type="datetimeFigureOut">
+              <a:rPr lang="en-US" smtClean="0"/>
+              <a:pPr/>
+              <a:t>4/15/2008</a:t>
+            </a:fld>
+            <a:endParaRPr lang="en-US"/>
+          </a:p>
+        </p:txBody>
+      </p:sp>
+      <p:sp>
+        <p:nvSpPr>
+          <p:cNvPr id="4" name="Footer Placeholder 3"/>
+          <p:cNvSpPr>
+            <a:spLocks noGrp="1"/>
+          </p:cNvSpPr>
+          <p:nvPr>
+            <p:ph type="ftr" sz="quarter" idx="2"/>
+          </p:nvPr>
+        </p:nvSpPr>
+        <p:spPr>
+          <a:xfrm>
+            <a:off x="0" y="8685213"/>
+            <a:ext cx="2971800" cy="457200"/>
+          </a:xfrm>
+          <a:prstGeom prst="rect">
+            <a:avLst/>
+          </a:prstGeom>
+        </p:spPr>
+        <p:txBody>
+          <a:bodyPr vert="horz" lIns="91440" tIns="45720" rIns="91440" bIns="45720" rtlCol="0" anchor="b"/>
+          <a:lstStyle>
+            <a:lvl1pPr algn="l">
+              <a:defRPr sz="1200"/>
+            </a:lvl1pPr>
+          </a:lstStyle>
+          <a:p>
+            <a:endParaRPr lang="en-US"/>
+          </a:p>
+        </p:txBody>
+      </p:sp>
+      <p:sp>
+        <p:nvSpPr>
+          <p:cNvPr id="5" name="Slide Number Placeholder 4"/>
+          <p:cNvSpPr>
+            <a:spLocks noGrp="1"/>
+          </p:cNvSpPr>
+          <p:nvPr>
+            <p:ph type="sldNum" sz="quarter" idx="3"/>
+          </p:nvPr>
+        </p:nvSpPr>
+        <p:spPr>
+          <a:xfrm>
+            <a:off x="3884613" y="8685213"/>
+            <a:ext cx="2971800" cy="457200"/>
+          </a:xfrm>
+          <a:prstGeom prst="rect">
+            <a:avLst/>
+          </a:prstGeom>
+        </p:spPr>
+        <p:txBody>
+          <a:bodyPr vert="horz" lIns="91440" tIns="45720" rIns="91440" bIns="45720" rtlCol="0" anchor="b"/>
+          <a:lstStyle>
+            <a:lvl1pPr algn="r">
+              <a:defRPr sz="1200"/>
+            </a:lvl1pPr>
+          </a:lstStyle>
+          <a:p>
+            <a:fld id="{5A6231CC-A8EB-42BD-A54B-1720694E6F88}" type="slidenum">
+              <a:rPr lang="en-US" smtClean="0"/>
+              <a:pPr/>
+              <a:t>‹#›</a:t>
+            </a:fld>
+            <a:endParaRPr lang="en-US"/>
+          </a:p>
+        </p:txBody>
+      </p:sp>
+    </p:spTree>
+  </p:cSld>
+  <p:clrMap bg1="lt1" tx1="dk1" bg2="lt2" tx2="dk2" accent1="accent1" accent2="accent2" accent3="accent3" accent4="accent4" accent5="accent5" accent6="accent6" hlink="hlink" folHlink="folHlink"/>
+</p:handoutMaster>
 </file>
 
 <file path=ppt/notesMasters/notesMaster1.xml><?xml version="1.0" encoding="utf-8"?>
@@ -505,7 +669,12 @@
             <p:ph type="sldImg"/>
           </p:nvPr>
         </p:nvSpPr>
-        <p:spPr/>
+        <p:spPr>
+          <a:xfrm>
+            <a:off x="1143000" y="685800"/>
+            <a:ext cx="4572000" cy="3429000"/>
+          </a:xfrm>
+        </p:spPr>
       </p:sp>
       <p:sp>
         <p:nvSpPr>
@@ -649,7 +818,12 @@
             <p:ph type="sldImg"/>
           </p:nvPr>
         </p:nvSpPr>
-        <p:spPr/>
+        <p:spPr>
+          <a:xfrm>
+            <a:off x="1143000" y="685800"/>
+            <a:ext cx="4572000" cy="3429000"/>
+          </a:xfrm>
+        </p:spPr>
       </p:sp>
       <p:sp>
         <p:nvSpPr>
@@ -785,7 +959,12 @@
             <p:ph type="sldImg"/>
           </p:nvPr>
         </p:nvSpPr>
-        <p:spPr/>
+        <p:spPr>
+          <a:xfrm>
+            <a:off x="1143000" y="685800"/>
+            <a:ext cx="4572000" cy="3429000"/>
+          </a:xfrm>
+        </p:spPr>
       </p:sp>
       <p:sp>
         <p:nvSpPr>
@@ -998,7 +1177,12 @@
             <p:ph type="sldImg"/>
           </p:nvPr>
         </p:nvSpPr>
-        <p:spPr/>
+        <p:spPr>
+          <a:xfrm>
+            <a:off x="1143000" y="685800"/>
+            <a:ext cx="4572000" cy="3429000"/>
+          </a:xfrm>
+        </p:spPr>
       </p:sp>
       <p:sp>
         <p:nvSpPr>
@@ -1138,7 +1322,12 @@
             <p:ph type="sldImg"/>
           </p:nvPr>
         </p:nvSpPr>
-        <p:spPr/>
+        <p:spPr>
+          <a:xfrm>
+            <a:off x="1143000" y="685800"/>
+            <a:ext cx="4572000" cy="3429000"/>
+          </a:xfrm>
+        </p:spPr>
       </p:sp>
       <p:sp>
         <p:nvSpPr>
@@ -1313,7 +1502,12 @@
             <p:ph type="sldImg"/>
           </p:nvPr>
         </p:nvSpPr>
-        <p:spPr/>
+        <p:spPr>
+          <a:xfrm>
+            <a:off x="1143000" y="685800"/>
+            <a:ext cx="4572000" cy="3429000"/>
+          </a:xfrm>
+        </p:spPr>
       </p:sp>
       <p:sp>
         <p:nvSpPr>
@@ -1415,7 +1609,12 @@
             <p:ph type="sldImg"/>
           </p:nvPr>
         </p:nvSpPr>
-        <p:spPr/>
+        <p:spPr>
+          <a:xfrm>
+            <a:off x="1143000" y="685800"/>
+            <a:ext cx="4572000" cy="3429000"/>
+          </a:xfrm>
+        </p:spPr>
       </p:sp>
       <p:sp>
         <p:nvSpPr>
@@ -1654,7 +1853,12 @@
             <p:ph type="sldImg"/>
           </p:nvPr>
         </p:nvSpPr>
-        <p:spPr/>
+        <p:spPr>
+          <a:xfrm>
+            <a:off x="1143000" y="685800"/>
+            <a:ext cx="4572000" cy="3429000"/>
+          </a:xfrm>
+        </p:spPr>
       </p:sp>
       <p:sp>
         <p:nvSpPr>
@@ -1774,7 +1978,12 @@
             <p:ph type="sldImg"/>
           </p:nvPr>
         </p:nvSpPr>
-        <p:spPr/>
+        <p:spPr>
+          <a:xfrm>
+            <a:off x="1143000" y="685800"/>
+            <a:ext cx="4572000" cy="3429000"/>
+          </a:xfrm>
+        </p:spPr>
       </p:sp>
       <p:sp>
         <p:nvSpPr>
@@ -1958,7 +2167,12 @@
             <p:ph type="sldImg"/>
           </p:nvPr>
         </p:nvSpPr>
-        <p:spPr/>
+        <p:spPr>
+          <a:xfrm>
+            <a:off x="1143000" y="685800"/>
+            <a:ext cx="4572000" cy="3429000"/>
+          </a:xfrm>
+        </p:spPr>
       </p:sp>
       <p:sp>
         <p:nvSpPr>
@@ -1981,8 +2195,8 @@
               <a:buAutoNum type="arabicPeriod"/>
             </a:pPr>
             <a:r>
-              <a:rPr lang="en-US" dirty="0" smtClean="0"/>
-              <a:t>New app</a:t>
+              <a:rPr lang="en-US" baseline="0" dirty="0" smtClean="0"/>
+              <a:t>Microsoft link has the documentation and the forums</a:t>
             </a:r>
           </a:p>
           <a:p>
@@ -1990,13 +2204,40 @@
               <a:buAutoNum type="arabicPeriod"/>
             </a:pPr>
             <a:r>
-              <a:rPr lang="en-US" dirty="0" smtClean="0"/>
-              <a:t>Demo</a:t>
-            </a:r>
-            <a:r>
               <a:rPr lang="en-US" baseline="0" dirty="0" smtClean="0"/>
-              <a:t> app</a:t>
-            </a:r>
+              <a:t>Toolkit has a running sample, and you get the source and sample with the download</a:t>
+            </a:r>
+          </a:p>
+          <a:p>
+            <a:pPr marL="228600" indent="-228600">
+              <a:buAutoNum type="arabicPeriod"/>
+            </a:pPr>
+            <a:r>
+              <a:rPr lang="en-US" baseline="0" dirty="0" smtClean="0"/>
+              <a:t>Scott Guthrie will have a link wrap-up every few weeks with some great AJAX stuff in addition to his own. A few of the links are to…</a:t>
+            </a:r>
+          </a:p>
+          <a:p>
+            <a:pPr marL="228600" indent="-228600">
+              <a:buAutoNum type="arabicPeriod"/>
+            </a:pPr>
+            <a:r>
+              <a:rPr lang="en-US" baseline="0" dirty="0" smtClean="0"/>
+              <a:t>Matt </a:t>
+            </a:r>
+            <a:r>
+              <a:rPr lang="en-US" baseline="0" dirty="0" err="1" smtClean="0"/>
+              <a:t>Berseth’s</a:t>
+            </a:r>
+            <a:r>
+              <a:rPr lang="en-US" baseline="0" dirty="0" smtClean="0"/>
+              <a:t> blog. Matt is doing some fun stuff with the toolkit.</a:t>
+            </a:r>
+          </a:p>
+          <a:p>
+            <a:pPr marL="228600" indent="-228600">
+              <a:buAutoNum type="arabicPeriod"/>
+            </a:pPr>
             <a:endParaRPr lang="en-US" dirty="0"/>
           </a:p>
         </p:txBody>
@@ -2016,7 +2257,7 @@
           <a:bodyPr/>
           <a:lstStyle/>
           <a:p>
-            <a:fld id="{F8007F4E-10F5-4104-9EF8-E98D370060A3}" type="slidenum">
+            <a:fld id="{D55A58F0-34EB-4AC8-8F16-CAEFD6BDFC59}" type="slidenum">
               <a:rPr lang="en-US" smtClean="0"/>
               <a:pPr/>
               <a:t>18</a:t>
@@ -2060,7 +2301,12 @@
             <p:ph type="sldImg"/>
           </p:nvPr>
         </p:nvSpPr>
-        <p:spPr/>
+        <p:spPr>
+          <a:xfrm>
+            <a:off x="1143000" y="685800"/>
+            <a:ext cx="4572000" cy="3429000"/>
+          </a:xfrm>
+        </p:spPr>
       </p:sp>
       <p:sp>
         <p:nvSpPr>
@@ -2079,54 +2325,28 @@
           </a:bodyPr>
           <a:lstStyle/>
           <a:p>
-            <a:pPr marL="228600" indent="-228600">
+            <a:pPr marL="228600" marR="0" indent="-228600" algn="l" defTabSz="914400" rtl="0" eaLnBrk="1" fontAlgn="auto" latinLnBrk="0" hangingPunct="1">
+              <a:lnSpc>
+                <a:spcPct val="100000"/>
+              </a:lnSpc>
+              <a:spcBef>
+                <a:spcPts val="0"/>
+              </a:spcBef>
+              <a:spcAft>
+                <a:spcPts val="0"/>
+              </a:spcAft>
+              <a:buClrTx/>
+              <a:buSzTx/>
+              <a:buFontTx/>
               <a:buAutoNum type="arabicPeriod"/>
+              <a:tabLst/>
+              <a:defRPr/>
             </a:pPr>
             <a:r>
-              <a:rPr lang="en-US" baseline="0" dirty="0" smtClean="0"/>
-              <a:t>Microsoft link has the documentation and the forums</a:t>
-            </a:r>
-          </a:p>
-          <a:p>
-            <a:pPr marL="228600" indent="-228600">
-              <a:buAutoNum type="arabicPeriod"/>
-            </a:pPr>
-            <a:r>
-              <a:rPr lang="en-US" baseline="0" dirty="0" smtClean="0"/>
-              <a:t>Toolkit has a running sample, and you get the source and sample with the download</a:t>
-            </a:r>
-          </a:p>
-          <a:p>
-            <a:pPr marL="228600" indent="-228600">
-              <a:buAutoNum type="arabicPeriod"/>
-            </a:pPr>
-            <a:r>
-              <a:rPr lang="en-US" baseline="0" dirty="0" smtClean="0"/>
-              <a:t>Scott Guthrie will have a link wrap-up every few weeks with some great AJAX stuff in addition to his own. A few of the links are to…</a:t>
-            </a:r>
-          </a:p>
-          <a:p>
-            <a:pPr marL="228600" indent="-228600">
-              <a:buAutoNum type="arabicPeriod"/>
-            </a:pPr>
-            <a:r>
-              <a:rPr lang="en-US" baseline="0" dirty="0" smtClean="0"/>
-              <a:t>Matt </a:t>
-            </a:r>
-            <a:r>
-              <a:rPr lang="en-US" baseline="0" dirty="0" err="1" smtClean="0"/>
-              <a:t>Berseth’s</a:t>
-            </a:r>
-            <a:r>
-              <a:rPr lang="en-US" baseline="0" dirty="0" smtClean="0"/>
-              <a:t> blog. Matt is doing some fun stuff with the toolkit.</a:t>
-            </a:r>
-          </a:p>
-          <a:p>
-            <a:pPr marL="228600" indent="-228600">
-              <a:buAutoNum type="arabicPeriod"/>
-            </a:pPr>
-            <a:endParaRPr lang="en-US" dirty="0"/>
+              <a:rPr lang="en-US" baseline="0" smtClean="0"/>
+              <a:t>Questions?</a:t>
+            </a:r>
+            <a:endParaRPr lang="en-US" baseline="0" dirty="0" smtClean="0"/>
           </a:p>
         </p:txBody>
       </p:sp>
@@ -2189,7 +2409,12 @@
             <p:ph type="sldImg"/>
           </p:nvPr>
         </p:nvSpPr>
-        <p:spPr/>
+        <p:spPr>
+          <a:xfrm>
+            <a:off x="1143000" y="685800"/>
+            <a:ext cx="4572000" cy="3429000"/>
+          </a:xfrm>
+        </p:spPr>
       </p:sp>
       <p:sp>
         <p:nvSpPr>
@@ -2279,109 +2504,6 @@
               <a:rPr lang="en-US" smtClean="0"/>
               <a:pPr/>
               <a:t>2</a:t>
-            </a:fld>
-            <a:endParaRPr lang="en-US"/>
-          </a:p>
-        </p:txBody>
-      </p:sp>
-    </p:spTree>
-  </p:cSld>
-  <p:clrMapOvr>
-    <a:masterClrMapping/>
-  </p:clrMapOvr>
-</p:notes>
-</file>
-
-<file path=ppt/notesSlides/notesSlide20.xml><?xml version="1.0" encoding="utf-8"?>
-<p:notes xmlns:a="http://schemas.openxmlformats.org/drawingml/2006/main" xmlns:r="http://schemas.openxmlformats.org/officeDocument/2006/relationships" xmlns:p="http://schemas.openxmlformats.org/presentationml/2006/main">
-  <p:cSld>
-    <p:spTree>
-      <p:nvGrpSpPr>
-        <p:cNvPr id="1" name=""/>
-        <p:cNvGrpSpPr/>
-        <p:nvPr/>
-      </p:nvGrpSpPr>
-      <p:grpSpPr>
-        <a:xfrm>
-          <a:off x="0" y="0"/>
-          <a:ext cx="0" cy="0"/>
-          <a:chOff x="0" y="0"/>
-          <a:chExt cx="0" cy="0"/>
-        </a:xfrm>
-      </p:grpSpPr>
-      <p:sp>
-        <p:nvSpPr>
-          <p:cNvPr id="2" name="Slide Image Placeholder 1"/>
-          <p:cNvSpPr>
-            <a:spLocks noGrp="1" noRot="1" noChangeAspect="1"/>
-          </p:cNvSpPr>
-          <p:nvPr>
-            <p:ph type="sldImg"/>
-          </p:nvPr>
-        </p:nvSpPr>
-        <p:spPr/>
-      </p:sp>
-      <p:sp>
-        <p:nvSpPr>
-          <p:cNvPr id="3" name="Notes Placeholder 2"/>
-          <p:cNvSpPr>
-            <a:spLocks noGrp="1"/>
-          </p:cNvSpPr>
-          <p:nvPr>
-            <p:ph type="body" idx="1"/>
-          </p:nvPr>
-        </p:nvSpPr>
-        <p:spPr/>
-        <p:txBody>
-          <a:bodyPr>
-            <a:normAutofit/>
-          </a:bodyPr>
-          <a:lstStyle/>
-          <a:p>
-            <a:pPr marL="228600" marR="0" indent="-228600" algn="l" defTabSz="914400" rtl="0" eaLnBrk="1" fontAlgn="auto" latinLnBrk="0" hangingPunct="1">
-              <a:lnSpc>
-                <a:spcPct val="100000"/>
-              </a:lnSpc>
-              <a:spcBef>
-                <a:spcPts val="0"/>
-              </a:spcBef>
-              <a:spcAft>
-                <a:spcPts val="0"/>
-              </a:spcAft>
-              <a:buClrTx/>
-              <a:buSzTx/>
-              <a:buFontTx/>
-              <a:buAutoNum type="arabicPeriod"/>
-              <a:tabLst/>
-              <a:defRPr/>
-            </a:pPr>
-            <a:r>
-              <a:rPr lang="en-US" baseline="0" smtClean="0"/>
-              <a:t>Questions?</a:t>
-            </a:r>
-            <a:endParaRPr lang="en-US" baseline="0" dirty="0" smtClean="0"/>
-          </a:p>
-        </p:txBody>
-      </p:sp>
-      <p:sp>
-        <p:nvSpPr>
-          <p:cNvPr id="4" name="Slide Number Placeholder 3"/>
-          <p:cNvSpPr>
-            <a:spLocks noGrp="1"/>
-          </p:cNvSpPr>
-          <p:nvPr>
-            <p:ph type="sldNum" sz="quarter" idx="10"/>
-          </p:nvPr>
-        </p:nvSpPr>
-        <p:spPr/>
-        <p:txBody>
-          <a:bodyPr/>
-          <a:lstStyle/>
-          <a:p>
-            <a:fld id="{D55A58F0-34EB-4AC8-8F16-CAEFD6BDFC59}" type="slidenum">
-              <a:rPr lang="en-US" smtClean="0"/>
-              <a:pPr/>
-              <a:t>20</a:t>
             </a:fld>
             <a:endParaRPr lang="en-US"/>
           </a:p>
@@ -2422,7 +2544,12 @@
             <p:ph type="sldImg"/>
           </p:nvPr>
         </p:nvSpPr>
-        <p:spPr/>
+        <p:spPr>
+          <a:xfrm>
+            <a:off x="1143000" y="685800"/>
+            <a:ext cx="4572000" cy="3429000"/>
+          </a:xfrm>
+        </p:spPr>
       </p:sp>
       <p:sp>
         <p:nvSpPr>
@@ -2573,7 +2700,12 @@
             <p:ph type="sldImg"/>
           </p:nvPr>
         </p:nvSpPr>
-        <p:spPr/>
+        <p:spPr>
+          <a:xfrm>
+            <a:off x="1143000" y="685800"/>
+            <a:ext cx="4572000" cy="3429000"/>
+          </a:xfrm>
+        </p:spPr>
       </p:sp>
       <p:sp>
         <p:nvSpPr>
@@ -2700,7 +2832,12 @@
             <p:ph type="sldImg"/>
           </p:nvPr>
         </p:nvSpPr>
-        <p:spPr/>
+        <p:spPr>
+          <a:xfrm>
+            <a:off x="1143000" y="685800"/>
+            <a:ext cx="4572000" cy="3429000"/>
+          </a:xfrm>
+        </p:spPr>
       </p:sp>
       <p:sp>
         <p:nvSpPr>
@@ -2921,7 +3058,12 @@
             <p:ph type="sldImg"/>
           </p:nvPr>
         </p:nvSpPr>
-        <p:spPr/>
+        <p:spPr>
+          <a:xfrm>
+            <a:off x="1143000" y="685800"/>
+            <a:ext cx="4572000" cy="3429000"/>
+          </a:xfrm>
+        </p:spPr>
       </p:sp>
       <p:sp>
         <p:nvSpPr>
@@ -3045,7 +3187,12 @@
             <p:ph type="sldImg"/>
           </p:nvPr>
         </p:nvSpPr>
-        <p:spPr/>
+        <p:spPr>
+          <a:xfrm>
+            <a:off x="1143000" y="685800"/>
+            <a:ext cx="4572000" cy="3429000"/>
+          </a:xfrm>
+        </p:spPr>
       </p:sp>
       <p:sp>
         <p:nvSpPr>
@@ -3160,7 +3307,12 @@
             <p:ph type="sldImg"/>
           </p:nvPr>
         </p:nvSpPr>
-        <p:spPr/>
+        <p:spPr>
+          <a:xfrm>
+            <a:off x="1143000" y="685800"/>
+            <a:ext cx="4572000" cy="3429000"/>
+          </a:xfrm>
+        </p:spPr>
       </p:sp>
       <p:sp>
         <p:nvSpPr>
@@ -3391,7 +3543,12 @@
             <p:ph type="sldImg"/>
           </p:nvPr>
         </p:nvSpPr>
-        <p:spPr/>
+        <p:spPr>
+          <a:xfrm>
+            <a:off x="1143000" y="685800"/>
+            <a:ext cx="4572000" cy="3429000"/>
+          </a:xfrm>
+        </p:spPr>
       </p:sp>
       <p:sp>
         <p:nvSpPr>
@@ -3699,7 +3856,7 @@
         </p:nvSpPr>
         <p:spPr>
           <a:xfrm>
-            <a:off x="309558" y="680477"/>
+            <a:off x="309559" y="680477"/>
             <a:ext cx="45720" cy="365760"/>
           </a:xfrm>
           <a:prstGeom prst="rect">
@@ -4397,7 +4554,7 @@
         </p:nvSpPr>
         <p:spPr>
           <a:xfrm>
-            <a:off x="6629400" y="274639"/>
+            <a:off x="6629400" y="274641"/>
             <a:ext cx="1981200" cy="5851525"/>
           </a:xfrm>
         </p:spPr>
@@ -4427,7 +4584,7 @@
         </p:nvSpPr>
         <p:spPr>
           <a:xfrm>
-            <a:off x="609600" y="274639"/>
+            <a:off x="609600" y="274641"/>
             <a:ext cx="5867400" cy="5851525"/>
           </a:xfrm>
         </p:spPr>
@@ -4860,7 +5017,7 @@
         </p:nvSpPr>
         <p:spPr bwMode="auto">
           <a:xfrm>
-            <a:off x="373966" y="0"/>
+            <a:off x="373967" y="1"/>
             <a:ext cx="5514536" cy="6615332"/>
           </a:xfrm>
           <a:custGeom>
@@ -5301,7 +5458,7 @@
         </p:nvSpPr>
         <p:spPr bwMode="auto">
           <a:xfrm>
-            <a:off x="5948363" y="4246563"/>
+            <a:off x="5948366" y="4246565"/>
             <a:ext cx="2090737" cy="2611437"/>
           </a:xfrm>
           <a:custGeom>
@@ -6068,7 +6225,7 @@
         </p:nvSpPr>
         <p:spPr>
           <a:xfrm>
-            <a:off x="706902" y="1351672"/>
+            <a:off x="706903" y="1351672"/>
             <a:ext cx="5718048" cy="977486"/>
           </a:xfrm>
         </p:spPr>
@@ -6217,7 +6374,7 @@
         </p:nvSpPr>
         <p:spPr>
           <a:xfrm>
-            <a:off x="363160" y="402264"/>
+            <a:off x="363160" y="402266"/>
             <a:ext cx="8503920" cy="886265"/>
           </a:xfrm>
           <a:prstGeom prst="rect">
@@ -6273,7 +6430,7 @@
         </p:nvSpPr>
         <p:spPr>
           <a:xfrm>
-            <a:off x="706902" y="512064"/>
+            <a:off x="706901" y="512064"/>
             <a:ext cx="8156448" cy="777240"/>
           </a:xfrm>
         </p:spPr>
@@ -6303,7 +6460,7 @@
         </p:nvSpPr>
         <p:spPr>
           <a:xfrm flipH="1">
-            <a:off x="371538" y="680477"/>
+            <a:off x="371539" y="680477"/>
             <a:ext cx="27432" cy="365760"/>
           </a:xfrm>
           <a:prstGeom prst="rect">
@@ -6399,7 +6556,7 @@
         </p:nvSpPr>
         <p:spPr>
           <a:xfrm flipH="1">
-            <a:off x="448450" y="680477"/>
+            <a:off x="448451" y="680477"/>
             <a:ext cx="9144" cy="365760"/>
           </a:xfrm>
           <a:prstGeom prst="rect">
@@ -6447,7 +6604,7 @@
         </p:nvSpPr>
         <p:spPr>
           <a:xfrm flipH="1">
-            <a:off x="476702" y="680477"/>
+            <a:off x="476703" y="680477"/>
             <a:ext cx="9144" cy="365760"/>
           </a:xfrm>
           <a:prstGeom prst="rect">
@@ -6495,7 +6652,7 @@
         </p:nvSpPr>
         <p:spPr>
           <a:xfrm>
-            <a:off x="500478" y="680477"/>
+            <a:off x="500479" y="680477"/>
             <a:ext cx="36576" cy="365760"/>
           </a:xfrm>
           <a:prstGeom prst="rect">
@@ -6602,7 +6759,7 @@
         </p:nvSpPr>
         <p:spPr>
           <a:xfrm>
-            <a:off x="464344" y="1770501"/>
+            <a:off x="464344" y="1770503"/>
             <a:ext cx="4038600" cy="4525963"/>
           </a:xfrm>
         </p:spPr>
@@ -6676,7 +6833,7 @@
         </p:nvSpPr>
         <p:spPr>
           <a:xfrm>
-            <a:off x="4655344" y="1770501"/>
+            <a:off x="4655344" y="1770503"/>
             <a:ext cx="4038600" cy="4525963"/>
           </a:xfrm>
         </p:spPr>
@@ -6844,7 +7001,7 @@
         </p:nvSpPr>
         <p:spPr>
           <a:xfrm>
-            <a:off x="0" y="402265"/>
+            <a:off x="0" y="402267"/>
             <a:ext cx="8867080" cy="886265"/>
           </a:xfrm>
           <a:prstGeom prst="rect">
@@ -6933,7 +7090,7 @@
         </p:nvSpPr>
         <p:spPr>
           <a:xfrm>
-            <a:off x="457200" y="1809750"/>
+            <a:off x="457202" y="1809750"/>
             <a:ext cx="4040188" cy="639762"/>
           </a:xfrm>
         </p:spPr>
@@ -6987,7 +7144,7 @@
         </p:nvSpPr>
         <p:spPr>
           <a:xfrm>
-            <a:off x="4645025" y="1809750"/>
+            <a:off x="4645027" y="1809750"/>
             <a:ext cx="4041775" cy="639762"/>
           </a:xfrm>
         </p:spPr>
@@ -7041,7 +7198,7 @@
         </p:nvSpPr>
         <p:spPr>
           <a:xfrm>
-            <a:off x="457200" y="2459037"/>
+            <a:off x="457202" y="2459037"/>
             <a:ext cx="4040188" cy="3959352"/>
           </a:xfrm>
         </p:spPr>
@@ -7115,7 +7272,7 @@
         </p:nvSpPr>
         <p:spPr>
           <a:xfrm>
-            <a:off x="4645025" y="2459037"/>
+            <a:off x="4645027" y="2459037"/>
             <a:ext cx="4041775" cy="3959352"/>
           </a:xfrm>
         </p:spPr>
@@ -7258,7 +7415,7 @@
         </p:nvSpPr>
         <p:spPr>
           <a:xfrm>
-            <a:off x="87790" y="680477"/>
+            <a:off x="87791" y="680477"/>
             <a:ext cx="45720" cy="365760"/>
           </a:xfrm>
           <a:prstGeom prst="rect">
@@ -7450,7 +7607,7 @@
         </p:nvSpPr>
         <p:spPr>
           <a:xfrm flipH="1">
-            <a:off x="149770" y="680477"/>
+            <a:off x="149771" y="680477"/>
             <a:ext cx="27432" cy="365760"/>
           </a:xfrm>
           <a:prstGeom prst="rect">
@@ -7546,7 +7703,7 @@
         </p:nvSpPr>
         <p:spPr>
           <a:xfrm flipH="1">
-            <a:off x="226682" y="680477"/>
+            <a:off x="226683" y="680477"/>
             <a:ext cx="9144" cy="365760"/>
           </a:xfrm>
           <a:prstGeom prst="rect">
@@ -7594,7 +7751,7 @@
         </p:nvSpPr>
         <p:spPr>
           <a:xfrm flipH="1">
-            <a:off x="254934" y="680477"/>
+            <a:off x="254935" y="680477"/>
             <a:ext cx="9144" cy="365760"/>
           </a:xfrm>
           <a:prstGeom prst="rect">
@@ -7642,7 +7799,7 @@
         </p:nvSpPr>
         <p:spPr>
           <a:xfrm>
-            <a:off x="278710" y="680477"/>
+            <a:off x="278711" y="680477"/>
             <a:ext cx="36576" cy="365760"/>
           </a:xfrm>
           <a:prstGeom prst="rect">
@@ -8200,7 +8357,7 @@
         </p:nvSpPr>
         <p:spPr>
           <a:xfrm>
-            <a:off x="368032" y="0"/>
+            <a:off x="368032" y="2"/>
             <a:ext cx="8778240" cy="1878037"/>
           </a:xfrm>
           <a:prstGeom prst="rect">
@@ -8250,8 +8407,8 @@
         </p:nvCxnSpPr>
         <p:spPr>
           <a:xfrm flipV="1">
-            <a:off x="363195" y="1885028"/>
-            <a:ext cx="8782622" cy="0"/>
+            <a:off x="363196" y="1885028"/>
+            <a:ext cx="8782623" cy="0"/>
           </a:xfrm>
           <a:prstGeom prst="line">
             <a:avLst/>
@@ -8291,8 +8448,8 @@
         </p:nvGrpSpPr>
         <p:grpSpPr>
           <a:xfrm rot="5400000">
-            <a:off x="8514581" y="1219200"/>
-            <a:ext cx="132763" cy="128466"/>
+            <a:off x="8514584" y="1219200"/>
+            <a:ext cx="132763" cy="128467"/>
             <a:chOff x="6668087" y="1297746"/>
             <a:chExt cx="161840" cy="156602"/>
           </a:xfrm>
@@ -8430,7 +8587,7 @@
         </p:nvSpPr>
         <p:spPr bwMode="grayWhite">
           <a:xfrm>
-            <a:off x="914400" y="441251"/>
+            <a:off x="914400" y="441253"/>
             <a:ext cx="6858000" cy="701749"/>
           </a:xfrm>
         </p:spPr>
@@ -8464,7 +8621,7 @@
         </p:nvSpPr>
         <p:spPr>
           <a:xfrm>
-            <a:off x="368032" y="1893781"/>
+            <a:off x="368032" y="1893783"/>
             <a:ext cx="8778240" cy="4960144"/>
           </a:xfrm>
           <a:solidFill>
@@ -8550,8 +8707,8 @@
         </p:nvGrpSpPr>
         <p:grpSpPr>
           <a:xfrm rot="5400000">
-            <a:off x="8666981" y="1371600"/>
-            <a:ext cx="132763" cy="128466"/>
+            <a:off x="8666984" y="1371600"/>
+            <a:ext cx="132763" cy="128467"/>
             <a:chOff x="6668087" y="1297746"/>
             <a:chExt cx="161840" cy="156602"/>
           </a:xfrm>
@@ -8685,8 +8842,8 @@
         </p:nvGrpSpPr>
         <p:grpSpPr>
           <a:xfrm rot="5400000">
-            <a:off x="8320088" y="1474763"/>
-            <a:ext cx="132763" cy="128466"/>
+            <a:off x="8320091" y="1474764"/>
+            <a:ext cx="132763" cy="128467"/>
             <a:chOff x="6668087" y="1297746"/>
             <a:chExt cx="161840" cy="156602"/>
           </a:xfrm>
@@ -8824,7 +8981,7 @@
         </p:nvSpPr>
         <p:spPr>
           <a:xfrm>
-            <a:off x="6477000" y="55499"/>
+            <a:off x="6477000" y="55501"/>
             <a:ext cx="2133600" cy="365125"/>
           </a:xfrm>
         </p:spPr>
@@ -8855,7 +9012,7 @@
         </p:nvSpPr>
         <p:spPr>
           <a:xfrm>
-            <a:off x="914400" y="55499"/>
+            <a:off x="914400" y="55501"/>
             <a:ext cx="5562600" cy="365125"/>
           </a:xfrm>
         </p:spPr>
@@ -8881,7 +9038,7 @@
         </p:nvSpPr>
         <p:spPr>
           <a:xfrm>
-            <a:off x="8610600" y="55499"/>
+            <a:off x="8610600" y="55501"/>
             <a:ext cx="457200" cy="365125"/>
           </a:xfrm>
         </p:spPr>
@@ -9186,7 +9343,7 @@
         </p:nvSpPr>
         <p:spPr>
           <a:xfrm>
-            <a:off x="309558" y="680477"/>
+            <a:off x="309559" y="680477"/>
             <a:ext cx="45720" cy="365760"/>
           </a:xfrm>
           <a:prstGeom prst="rect">
@@ -9489,7 +9646,7 @@
         </p:nvSpPr>
         <p:spPr>
           <a:xfrm>
-            <a:off x="6477000" y="6416675"/>
+            <a:off x="6477000" y="6416677"/>
             <a:ext cx="2133600" cy="365125"/>
           </a:xfrm>
           <a:prstGeom prst="rect">
@@ -9530,7 +9687,7 @@
         </p:nvSpPr>
         <p:spPr>
           <a:xfrm>
-            <a:off x="914400" y="6416675"/>
+            <a:off x="914400" y="6416677"/>
             <a:ext cx="5562600" cy="365125"/>
           </a:xfrm>
           <a:prstGeom prst="rect">
@@ -9566,7 +9723,7 @@
         </p:nvSpPr>
         <p:spPr>
           <a:xfrm>
-            <a:off x="8610600" y="6416675"/>
+            <a:off x="8610600" y="6416677"/>
             <a:ext cx="457200" cy="365125"/>
           </a:xfrm>
           <a:prstGeom prst="rect">
@@ -10048,7 +10205,7 @@
         </p:blipFill>
         <p:spPr bwMode="auto">
           <a:xfrm>
-            <a:off x="2813420" y="1828800"/>
+            <a:off x="2813422" y="1828800"/>
             <a:ext cx="3517161" cy="4038600"/>
           </a:xfrm>
           <a:prstGeom prst="rect">
@@ -10142,8 +10299,8 @@
         </p:blipFill>
         <p:spPr bwMode="auto">
           <a:xfrm>
-            <a:off x="2922017" y="1905000"/>
-            <a:ext cx="3299966" cy="3657600"/>
+            <a:off x="2922019" y="1905000"/>
+            <a:ext cx="3299967" cy="3657600"/>
           </a:xfrm>
           <a:prstGeom prst="rect">
             <a:avLst/>
@@ -11013,7 +11170,7 @@
         </p:blipFill>
         <p:spPr bwMode="auto">
           <a:xfrm>
-            <a:off x="838200" y="1600200"/>
+            <a:off x="838203" y="1600200"/>
             <a:ext cx="2810655" cy="2286000"/>
           </a:xfrm>
           <a:prstGeom prst="rect">
@@ -11781,7 +11938,7 @@
         </p:blipFill>
         <p:spPr bwMode="auto">
           <a:xfrm>
-            <a:off x="2263513" y="2133600"/>
+            <a:off x="2263515" y="2133600"/>
             <a:ext cx="4616975" cy="3200400"/>
           </a:xfrm>
           <a:prstGeom prst="rect">
@@ -11837,33 +11994,105 @@
             <p:ph type="title"/>
           </p:nvPr>
         </p:nvSpPr>
-        <p:spPr>
-          <a:xfrm>
-            <a:off x="914400" y="2819400"/>
-            <a:ext cx="7772400" cy="1447800"/>
-          </a:xfrm>
-        </p:spPr>
+        <p:spPr/>
         <p:txBody>
           <a:bodyPr/>
           <a:lstStyle/>
           <a:p>
             <a:r>
-              <a:rPr lang="en-US" sz="6000" dirty="0" smtClean="0">
-                <a:solidFill>
-                  <a:srgbClr val="FFC000"/>
-                </a:solidFill>
-                <a:latin typeface="Courier New" pitchFamily="49" charset="0"/>
-                <a:cs typeface="Courier New" pitchFamily="49" charset="0"/>
-              </a:rPr>
-              <a:t>&lt;code /&gt;</a:t>
-            </a:r>
-            <a:endParaRPr lang="en-US" sz="6000" dirty="0">
-              <a:solidFill>
-                <a:srgbClr val="FFC000"/>
-              </a:solidFill>
-              <a:latin typeface="Courier New" pitchFamily="49" charset="0"/>
-              <a:cs typeface="Courier New" pitchFamily="49" charset="0"/>
-            </a:endParaRPr>
+              <a:rPr lang="en-US" dirty="0" smtClean="0"/>
+              <a:t>Resources</a:t>
+            </a:r>
+            <a:endParaRPr lang="en-US" dirty="0"/>
+          </a:p>
+        </p:txBody>
+      </p:sp>
+      <p:sp>
+        <p:nvSpPr>
+          <p:cNvPr id="3" name="Content Placeholder 2"/>
+          <p:cNvSpPr>
+            <a:spLocks noGrp="1"/>
+          </p:cNvSpPr>
+          <p:nvPr>
+            <p:ph idx="1"/>
+          </p:nvPr>
+        </p:nvSpPr>
+        <p:spPr/>
+        <p:txBody>
+          <a:bodyPr/>
+          <a:lstStyle/>
+          <a:p>
+            <a:r>
+              <a:rPr lang="en-US" dirty="0" smtClean="0"/>
+              <a:t>Microsoft AJAX libraries: ajax.asp.net</a:t>
+            </a:r>
+          </a:p>
+          <a:p>
+            <a:r>
+              <a:rPr lang="en-US" dirty="0" smtClean="0"/>
+              <a:t>Toolkit: asp.net/</a:t>
+            </a:r>
+            <a:r>
+              <a:rPr lang="en-US" dirty="0" err="1" smtClean="0"/>
+              <a:t>ajax</a:t>
+            </a:r>
+            <a:r>
+              <a:rPr lang="en-US" dirty="0" smtClean="0"/>
+              <a:t>/</a:t>
+            </a:r>
+            <a:r>
+              <a:rPr lang="en-US" dirty="0" err="1" smtClean="0"/>
+              <a:t>ajaxcontroltoolkit</a:t>
+            </a:r>
+            <a:r>
+              <a:rPr lang="en-US" dirty="0" smtClean="0"/>
+              <a:t>/</a:t>
+            </a:r>
+          </a:p>
+          <a:p>
+            <a:r>
+              <a:rPr lang="en-US" dirty="0" smtClean="0"/>
+              <a:t>Scott Guthrie: weblogs.asp.net/</a:t>
+            </a:r>
+            <a:r>
+              <a:rPr lang="en-US" dirty="0" err="1" smtClean="0"/>
+              <a:t>scottgu</a:t>
+            </a:r>
+            <a:r>
+              <a:rPr lang="en-US" dirty="0" smtClean="0"/>
+              <a:t>/</a:t>
+            </a:r>
+          </a:p>
+          <a:p>
+            <a:r>
+              <a:rPr lang="en-US" dirty="0" smtClean="0"/>
+              <a:t>Matt </a:t>
+            </a:r>
+            <a:r>
+              <a:rPr lang="en-US" dirty="0" err="1" smtClean="0"/>
+              <a:t>Berseth</a:t>
+            </a:r>
+            <a:r>
+              <a:rPr lang="en-US" dirty="0" smtClean="0"/>
+              <a:t>: mattberseth.com</a:t>
+            </a:r>
+          </a:p>
+          <a:p>
+            <a:r>
+              <a:rPr lang="en-US" dirty="0" smtClean="0"/>
+              <a:t>David Hayden: davidhayden.com/blog/</a:t>
+            </a:r>
+            <a:r>
+              <a:rPr lang="en-US" dirty="0" err="1" smtClean="0"/>
+              <a:t>dave</a:t>
+            </a:r>
+            <a:r>
+              <a:rPr lang="en-US" dirty="0" smtClean="0"/>
+              <a:t>/</a:t>
+            </a:r>
+          </a:p>
+          <a:p>
+            <a:endParaRPr lang="en-US" dirty="0"/>
           </a:p>
         </p:txBody>
       </p:sp>
@@ -11916,7 +12145,7 @@
           <a:p>
             <a:r>
               <a:rPr lang="en-US" dirty="0" smtClean="0"/>
-              <a:t>Resources</a:t>
+              <a:t>Tim Wingfield</a:t>
             </a:r>
             <a:endParaRPr lang="en-US" dirty="0"/>
           </a:p>
@@ -11932,82 +12161,73 @@
             <p:ph idx="1"/>
           </p:nvPr>
         </p:nvSpPr>
-        <p:spPr/>
-        <p:txBody>
-          <a:bodyPr/>
+        <p:spPr>
+          <a:xfrm>
+            <a:off x="914400" y="1783560"/>
+            <a:ext cx="8001000" cy="4572000"/>
+          </a:xfrm>
+        </p:spPr>
+        <p:txBody>
+          <a:bodyPr>
+            <a:normAutofit/>
+          </a:bodyPr>
           <a:lstStyle/>
           <a:p>
             <a:r>
-              <a:rPr lang="en-US" dirty="0" smtClean="0"/>
-              <a:t>Microsoft AJAX libraries: ajax.asp.net</a:t>
-            </a:r>
-          </a:p>
-          <a:p>
-            <a:r>
-              <a:rPr lang="en-US" dirty="0" smtClean="0"/>
-              <a:t>Toolkit: asp.net/</a:t>
-            </a:r>
-            <a:r>
-              <a:rPr lang="en-US" dirty="0" err="1" smtClean="0"/>
+              <a:rPr lang="en-US" sz="2800" dirty="0" smtClean="0"/>
+              <a:t>Email: </a:t>
+            </a:r>
+            <a:r>
+              <a:rPr lang="en-US" sz="2800" dirty="0" smtClean="0">
+                <a:hlinkClick r:id="rId3"/>
+              </a:rPr>
+              <a:t>tim@timwingfield.com</a:t>
+            </a:r>
+            <a:endParaRPr lang="en-US" sz="2800" dirty="0" smtClean="0"/>
+          </a:p>
+          <a:p>
+            <a:r>
+              <a:rPr lang="en-US" sz="2800" dirty="0" smtClean="0"/>
+              <a:t>Blog: blog.timwingfield.com</a:t>
+            </a:r>
+          </a:p>
+          <a:p>
+            <a:r>
+              <a:rPr lang="en-US" sz="2800" dirty="0" smtClean="0"/>
+              <a:t>Twitter: </a:t>
+            </a:r>
+            <a:r>
+              <a:rPr lang="en-US" sz="2800" dirty="0" err="1" smtClean="0"/>
+              <a:t>timwingfield</a:t>
+            </a:r>
+            <a:endParaRPr lang="en-US" sz="2800" dirty="0" smtClean="0"/>
+          </a:p>
+          <a:p>
+            <a:r>
+              <a:rPr lang="en-US" sz="2800" dirty="0" smtClean="0"/>
+              <a:t>Code </a:t>
+            </a:r>
+            <a:r>
+              <a:rPr lang="en-US" sz="2800" dirty="0" smtClean="0"/>
+              <a:t>and Slides: </a:t>
+            </a:r>
+            <a:r>
+              <a:rPr lang="en-US" sz="2800" dirty="0" smtClean="0"/>
+              <a:t>code.google.com/p/</a:t>
+            </a:r>
+            <a:r>
+              <a:rPr lang="en-US" sz="2800" dirty="0" err="1" smtClean="0"/>
+              <a:t>codeincubator</a:t>
+            </a:r>
+            <a:r>
+              <a:rPr lang="en-US" sz="2800" dirty="0" smtClean="0"/>
+              <a:t>/source/browse/Samples/Intro-to-asp.net-</a:t>
+            </a:r>
+            <a:r>
+              <a:rPr lang="en-US" sz="2800" dirty="0" err="1" smtClean="0"/>
               <a:t>ajax</a:t>
             </a:r>
-            <a:r>
-              <a:rPr lang="en-US" dirty="0" smtClean="0"/>
-              <a:t>/</a:t>
-            </a:r>
-            <a:r>
-              <a:rPr lang="en-US" dirty="0" err="1" smtClean="0"/>
-              <a:t>ajaxcontroltoolkit</a:t>
-            </a:r>
-            <a:r>
-              <a:rPr lang="en-US" dirty="0" smtClean="0"/>
-              <a:t>/</a:t>
-            </a:r>
-          </a:p>
-          <a:p>
-            <a:r>
-              <a:rPr lang="en-US" dirty="0" smtClean="0"/>
-              <a:t>Scott Guthrie: weblogs.asp.net/</a:t>
-            </a:r>
-            <a:r>
-              <a:rPr lang="en-US" dirty="0" err="1" smtClean="0"/>
-              <a:t>scottgu</a:t>
-            </a:r>
-            <a:r>
-              <a:rPr lang="en-US" dirty="0" smtClean="0"/>
-              <a:t>/</a:t>
-            </a:r>
-          </a:p>
-          <a:p>
-            <a:r>
-              <a:rPr lang="en-US" dirty="0" smtClean="0"/>
-              <a:t>Matt </a:t>
-            </a:r>
-            <a:r>
-              <a:rPr lang="en-US" dirty="0" err="1" smtClean="0"/>
-              <a:t>Berseth</a:t>
-            </a:r>
-            <a:r>
-              <a:rPr lang="en-US" dirty="0" smtClean="0"/>
-              <a:t>: mattberseth.com</a:t>
-            </a:r>
-          </a:p>
-          <a:p>
-            <a:r>
-              <a:rPr lang="en-US" dirty="0" smtClean="0"/>
-              <a:t>David Hayden: davidhayden.com/blog/</a:t>
-            </a:r>
-            <a:r>
-              <a:rPr lang="en-US" dirty="0" err="1" smtClean="0"/>
-              <a:t>dave</a:t>
-            </a:r>
-            <a:r>
-              <a:rPr lang="en-US" dirty="0" smtClean="0"/>
-              <a:t>/</a:t>
-            </a:r>
-          </a:p>
-          <a:p>
-            <a:endParaRPr lang="en-US" dirty="0"/>
+            <a:endParaRPr lang="en-US" sz="2800" dirty="0" smtClean="0"/>
           </a:p>
         </p:txBody>
       </p:sp>
@@ -12060,7 +12280,7 @@
         </p:blipFill>
         <p:spPr bwMode="auto">
           <a:xfrm>
-            <a:off x="609600" y="457200"/>
+            <a:off x="609600" y="457202"/>
             <a:ext cx="2362200" cy="2362201"/>
           </a:xfrm>
           <a:prstGeom prst="rect">
@@ -12089,7 +12309,7 @@
         </p:blipFill>
         <p:spPr bwMode="auto">
           <a:xfrm>
-            <a:off x="5694511" y="838200"/>
+            <a:off x="5694514" y="838200"/>
             <a:ext cx="2916089" cy="2743200"/>
           </a:xfrm>
           <a:prstGeom prst="rect">
@@ -12115,7 +12335,7 @@
         </p:blipFill>
         <p:spPr bwMode="auto">
           <a:xfrm>
-            <a:off x="3381412" y="4193177"/>
+            <a:off x="3381414" y="4193179"/>
             <a:ext cx="1817129" cy="1762616"/>
           </a:xfrm>
           <a:prstGeom prst="rect">
@@ -12144,7 +12364,7 @@
         </p:blipFill>
         <p:spPr bwMode="auto">
           <a:xfrm>
-            <a:off x="916466" y="4267200"/>
+            <a:off x="916467" y="4267202"/>
             <a:ext cx="1781504" cy="1687867"/>
           </a:xfrm>
           <a:prstGeom prst="rect">
@@ -12202,7 +12422,7 @@
         </p:blipFill>
         <p:spPr bwMode="auto">
           <a:xfrm>
-            <a:off x="6324600" y="1752600"/>
+            <a:off x="6324600" y="1752601"/>
             <a:ext cx="381000" cy="142875"/>
           </a:xfrm>
           <a:prstGeom prst="rect">
@@ -12228,7 +12448,7 @@
         </p:blipFill>
         <p:spPr bwMode="auto">
           <a:xfrm>
-            <a:off x="7086600" y="2133600"/>
+            <a:off x="7086600" y="2133602"/>
             <a:ext cx="381000" cy="142875"/>
           </a:xfrm>
           <a:prstGeom prst="rect">
@@ -12523,109 +12743,6 @@
 </p:sld>
 </file>
 
-<file path=ppt/slides/slide20.xml><?xml version="1.0" encoding="utf-8"?>
-<p:sld xmlns:a="http://schemas.openxmlformats.org/drawingml/2006/main" xmlns:r="http://schemas.openxmlformats.org/officeDocument/2006/relationships" xmlns:p="http://schemas.openxmlformats.org/presentationml/2006/main" showMasterSp="0">
-  <p:cSld>
-    <p:spTree>
-      <p:nvGrpSpPr>
-        <p:cNvPr id="1" name=""/>
-        <p:cNvGrpSpPr/>
-        <p:nvPr/>
-      </p:nvGrpSpPr>
-      <p:grpSpPr>
-        <a:xfrm>
-          <a:off x="0" y="0"/>
-          <a:ext cx="0" cy="0"/>
-          <a:chOff x="0" y="0"/>
-          <a:chExt cx="0" cy="0"/>
-        </a:xfrm>
-      </p:grpSpPr>
-      <p:sp>
-        <p:nvSpPr>
-          <p:cNvPr id="2" name="Title 1"/>
-          <p:cNvSpPr>
-            <a:spLocks noGrp="1"/>
-          </p:cNvSpPr>
-          <p:nvPr>
-            <p:ph type="title"/>
-          </p:nvPr>
-        </p:nvSpPr>
-        <p:spPr/>
-        <p:txBody>
-          <a:bodyPr/>
-          <a:lstStyle/>
-          <a:p>
-            <a:r>
-              <a:rPr lang="en-US" dirty="0" smtClean="0"/>
-              <a:t>Tim Wingfield</a:t>
-            </a:r>
-            <a:endParaRPr lang="en-US" dirty="0"/>
-          </a:p>
-        </p:txBody>
-      </p:sp>
-      <p:sp>
-        <p:nvSpPr>
-          <p:cNvPr id="3" name="Content Placeholder 2"/>
-          <p:cNvSpPr>
-            <a:spLocks noGrp="1"/>
-          </p:cNvSpPr>
-          <p:nvPr>
-            <p:ph idx="1"/>
-          </p:nvPr>
-        </p:nvSpPr>
-        <p:spPr/>
-        <p:txBody>
-          <a:bodyPr>
-            <a:normAutofit/>
-          </a:bodyPr>
-          <a:lstStyle/>
-          <a:p>
-            <a:r>
-              <a:rPr lang="en-US" sz="2800" dirty="0" smtClean="0"/>
-              <a:t>Email: </a:t>
-            </a:r>
-            <a:r>
-              <a:rPr lang="en-US" sz="2800" dirty="0" smtClean="0">
-                <a:hlinkClick r:id="rId3"/>
-              </a:rPr>
-              <a:t>tim@timwingfield.com</a:t>
-            </a:r>
-            <a:endParaRPr lang="en-US" sz="2800" dirty="0" smtClean="0"/>
-          </a:p>
-          <a:p>
-            <a:r>
-              <a:rPr lang="en-US" sz="2800" dirty="0" smtClean="0"/>
-              <a:t>Blog: blog.timwingfield.com</a:t>
-            </a:r>
-          </a:p>
-          <a:p>
-            <a:r>
-              <a:rPr lang="en-US" sz="2800" dirty="0" smtClean="0"/>
-              <a:t>Twitter: </a:t>
-            </a:r>
-            <a:r>
-              <a:rPr lang="en-US" sz="2800" dirty="0" err="1" smtClean="0"/>
-              <a:t>timwingfield</a:t>
-            </a:r>
-            <a:endParaRPr lang="en-US" sz="2800" dirty="0" smtClean="0"/>
-          </a:p>
-        </p:txBody>
-      </p:sp>
-    </p:spTree>
-  </p:cSld>
-  <p:clrMapOvr>
-    <a:masterClrMapping/>
-  </p:clrMapOvr>
-  <p:timing>
-    <p:tnLst>
-      <p:par>
-        <p:cTn id="1" dur="indefinite" restart="never" nodeType="tmRoot"/>
-      </p:par>
-    </p:tnLst>
-  </p:timing>
-</p:sld>
-</file>
-
 <file path=ppt/slides/slide3.xml><?xml version="1.0" encoding="utf-8"?>
 <p:sld xmlns:a="http://schemas.openxmlformats.org/drawingml/2006/main" xmlns:r="http://schemas.openxmlformats.org/officeDocument/2006/relationships" xmlns:p="http://schemas.openxmlformats.org/presentationml/2006/main" showMasterSp="0">
   <p:cSld>
@@ -12686,7 +12803,7 @@
         </p:blipFill>
         <p:spPr bwMode="auto">
           <a:xfrm>
-            <a:off x="1981200" y="2286000"/>
+            <a:off x="1981202" y="2286002"/>
             <a:ext cx="6667500" cy="2047875"/>
           </a:xfrm>
           <a:prstGeom prst="rect">
@@ -12712,7 +12829,7 @@
         </p:blipFill>
         <p:spPr bwMode="auto">
           <a:xfrm>
-            <a:off x="6248400" y="4648200"/>
+            <a:off x="6248403" y="4648200"/>
             <a:ext cx="1904999" cy="1419030"/>
           </a:xfrm>
           <a:prstGeom prst="rect">
@@ -12764,7 +12881,7 @@
         </p:blipFill>
         <p:spPr bwMode="auto">
           <a:xfrm>
-            <a:off x="1143000" y="4800600"/>
+            <a:off x="1143000" y="4800602"/>
             <a:ext cx="1676400" cy="1312843"/>
           </a:xfrm>
           <a:prstGeom prst="rect">
@@ -13077,7 +13194,7 @@
         </p:blipFill>
         <p:spPr bwMode="auto">
           <a:xfrm>
-            <a:off x="2362200" y="1948928"/>
+            <a:off x="2362203" y="1948929"/>
             <a:ext cx="4419599" cy="1403872"/>
           </a:xfrm>
           <a:prstGeom prst="rect">
@@ -13164,7 +13281,7 @@
         </p:blipFill>
         <p:spPr bwMode="auto">
           <a:xfrm>
-            <a:off x="2571750" y="2209800"/>
+            <a:off x="2571752" y="2209800"/>
             <a:ext cx="4000501" cy="3810000"/>
           </a:xfrm>
           <a:prstGeom prst="rect">
@@ -13374,8 +13491,8 @@
         </p:blipFill>
         <p:spPr bwMode="auto">
           <a:xfrm>
-            <a:off x="776110" y="457200"/>
-            <a:ext cx="7986890" cy="1143000"/>
+            <a:off x="776109" y="457200"/>
+            <a:ext cx="7986891" cy="1143000"/>
           </a:xfrm>
           <a:prstGeom prst="rect">
             <a:avLst/>
@@ -14623,4 +14740,287 @@
   <a:objectDefaults/>
   <a:extraClrSchemeLst/>
 </a:theme>
+</file>
+
+<file path=ppt/theme/theme3.xml><?xml version="1.0" encoding="utf-8"?>
+<a:theme xmlns:a="http://schemas.openxmlformats.org/drawingml/2006/main" name="Office Theme">
+  <a:themeElements>
+    <a:clrScheme name="Office">
+      <a:dk1>
+        <a:sysClr val="windowText" lastClr="000000"/>
+      </a:dk1>
+      <a:lt1>
+        <a:sysClr val="window" lastClr="FFFFFF"/>
+      </a:lt1>
+      <a:dk2>
+        <a:srgbClr val="1F497D"/>
+      </a:dk2>
+      <a:lt2>
+        <a:srgbClr val="EEECE1"/>
+      </a:lt2>
+      <a:accent1>
+        <a:srgbClr val="4F81BD"/>
+      </a:accent1>
+      <a:accent2>
+        <a:srgbClr val="C0504D"/>
+      </a:accent2>
+      <a:accent3>
+        <a:srgbClr val="9BBB59"/>
+      </a:accent3>
+      <a:accent4>
+        <a:srgbClr val="8064A2"/>
+      </a:accent4>
+      <a:accent5>
+        <a:srgbClr val="4BACC6"/>
+      </a:accent5>
+      <a:accent6>
+        <a:srgbClr val="F79646"/>
+      </a:accent6>
+      <a:hlink>
+        <a:srgbClr val="0000FF"/>
+      </a:hlink>
+      <a:folHlink>
+        <a:srgbClr val="800080"/>
+      </a:folHlink>
+    </a:clrScheme>
+    <a:fontScheme name="Office">
+      <a:majorFont>
+        <a:latin typeface="Calibri"/>
+        <a:ea typeface=""/>
+        <a:cs typeface=""/>
+        <a:font script="Jpan" typeface="ＭＳ Ｐゴシック"/>
+        <a:font script="Hang" typeface="맑은 고딕"/>
+        <a:font script="Hans" typeface="宋体"/>
+        <a:font script="Hant" typeface="新細明體"/>
+        <a:font script="Arab" typeface="Times New Roman"/>
+        <a:font script="Hebr" typeface="Times New Roman"/>
+        <a:font script="Thai" typeface="Angsana New"/>
+        <a:font script="Ethi" typeface="Nyala"/>
+        <a:font script="Beng" typeface="Vrinda"/>
+        <a:font script="Gujr" typeface="Shruti"/>
+        <a:font script="Khmr" typeface="MoolBoran"/>
+        <a:font script="Knda" typeface="Tunga"/>
+        <a:font script="Guru" typeface="Raavi"/>
+        <a:font script="Cans" typeface="Euphemia"/>
+        <a:font script="Cher" typeface="Plantagenet Cherokee"/>
+        <a:font script="Yiii" typeface="Microsoft Yi Baiti"/>
+        <a:font script="Tibt" typeface="Microsoft Himalaya"/>
+        <a:font script="Thaa" typeface="MV Boli"/>
+        <a:font script="Deva" typeface="Mangal"/>
+        <a:font script="Telu" typeface="Gautami"/>
+        <a:font script="Taml" typeface="Latha"/>
+        <a:font script="Syrc" typeface="Estrangelo Edessa"/>
+        <a:font script="Orya" typeface="Kalinga"/>
+        <a:font script="Mlym" typeface="Kartika"/>
+        <a:font script="Laoo" typeface="DokChampa"/>
+        <a:font script="Sinh" typeface="Iskoola Pota"/>
+        <a:font script="Mong" typeface="Mongolian Baiti"/>
+        <a:font script="Viet" typeface="Times New Roman"/>
+        <a:font script="Uigh" typeface="Microsoft Uighur"/>
+      </a:majorFont>
+      <a:minorFont>
+        <a:latin typeface="Calibri"/>
+        <a:ea typeface=""/>
+        <a:cs typeface=""/>
+        <a:font script="Jpan" typeface="ＭＳ Ｐゴシック"/>
+        <a:font script="Hang" typeface="맑은 고딕"/>
+        <a:font script="Hans" typeface="宋体"/>
+        <a:font script="Hant" typeface="新細明體"/>
+        <a:font script="Arab" typeface="Arial"/>
+        <a:font script="Hebr" typeface="Arial"/>
+        <a:font script="Thai" typeface="Cordia New"/>
+        <a:font script="Ethi" typeface="Nyala"/>
+        <a:font script="Beng" typeface="Vrinda"/>
+        <a:font script="Gujr" typeface="Shruti"/>
+        <a:font script="Khmr" typeface="DaunPenh"/>
+        <a:font script="Knda" typeface="Tunga"/>
+        <a:font script="Guru" typeface="Raavi"/>
+        <a:font script="Cans" typeface="Euphemia"/>
+        <a:font script="Cher" typeface="Plantagenet Cherokee"/>
+        <a:font script="Yiii" typeface="Microsoft Yi Baiti"/>
+        <a:font script="Tibt" typeface="Microsoft Himalaya"/>
+        <a:font script="Thaa" typeface="MV Boli"/>
+        <a:font script="Deva" typeface="Mangal"/>
+        <a:font script="Telu" typeface="Gautami"/>
+        <a:font script="Taml" typeface="Latha"/>
+        <a:font script="Syrc" typeface="Estrangelo Edessa"/>
+        <a:font script="Orya" typeface="Kalinga"/>
+        <a:font script="Mlym" typeface="Kartika"/>
+        <a:font script="Laoo" typeface="DokChampa"/>
+        <a:font script="Sinh" typeface="Iskoola Pota"/>
+        <a:font script="Mong" typeface="Mongolian Baiti"/>
+        <a:font script="Viet" typeface="Arial"/>
+        <a:font script="Uigh" typeface="Microsoft Uighur"/>
+      </a:minorFont>
+    </a:fontScheme>
+    <a:fmtScheme name="Office">
+      <a:fillStyleLst>
+        <a:solidFill>
+          <a:schemeClr val="phClr"/>
+        </a:solidFill>
+        <a:gradFill rotWithShape="1">
+          <a:gsLst>
+            <a:gs pos="0">
+              <a:schemeClr val="phClr">
+                <a:tint val="50000"/>
+                <a:satMod val="300000"/>
+              </a:schemeClr>
+            </a:gs>
+            <a:gs pos="35000">
+              <a:schemeClr val="phClr">
+                <a:tint val="37000"/>
+                <a:satMod val="300000"/>
+              </a:schemeClr>
+            </a:gs>
+            <a:gs pos="100000">
+              <a:schemeClr val="phClr">
+                <a:tint val="15000"/>
+                <a:satMod val="350000"/>
+              </a:schemeClr>
+            </a:gs>
+          </a:gsLst>
+          <a:lin ang="16200000" scaled="1"/>
+        </a:gradFill>
+        <a:gradFill rotWithShape="1">
+          <a:gsLst>
+            <a:gs pos="0">
+              <a:schemeClr val="phClr">
+                <a:shade val="51000"/>
+                <a:satMod val="130000"/>
+              </a:schemeClr>
+            </a:gs>
+            <a:gs pos="80000">
+              <a:schemeClr val="phClr">
+                <a:shade val="93000"/>
+                <a:satMod val="130000"/>
+              </a:schemeClr>
+            </a:gs>
+            <a:gs pos="100000">
+              <a:schemeClr val="phClr">
+                <a:shade val="94000"/>
+                <a:satMod val="135000"/>
+              </a:schemeClr>
+            </a:gs>
+          </a:gsLst>
+          <a:lin ang="16200000" scaled="0"/>
+        </a:gradFill>
+      </a:fillStyleLst>
+      <a:lnStyleLst>
+        <a:ln w="9525" cap="flat" cmpd="sng" algn="ctr">
+          <a:solidFill>
+            <a:schemeClr val="phClr">
+              <a:shade val="95000"/>
+              <a:satMod val="105000"/>
+            </a:schemeClr>
+          </a:solidFill>
+          <a:prstDash val="solid"/>
+        </a:ln>
+        <a:ln w="25400" cap="flat" cmpd="sng" algn="ctr">
+          <a:solidFill>
+            <a:schemeClr val="phClr"/>
+          </a:solidFill>
+          <a:prstDash val="solid"/>
+        </a:ln>
+        <a:ln w="38100" cap="flat" cmpd="sng" algn="ctr">
+          <a:solidFill>
+            <a:schemeClr val="phClr"/>
+          </a:solidFill>
+          <a:prstDash val="solid"/>
+        </a:ln>
+      </a:lnStyleLst>
+      <a:effectStyleLst>
+        <a:effectStyle>
+          <a:effectLst>
+            <a:outerShdw blurRad="40000" dist="20000" dir="5400000" rotWithShape="0">
+              <a:srgbClr val="000000">
+                <a:alpha val="38000"/>
+              </a:srgbClr>
+            </a:outerShdw>
+          </a:effectLst>
+        </a:effectStyle>
+        <a:effectStyle>
+          <a:effectLst>
+            <a:outerShdw blurRad="40000" dist="23000" dir="5400000" rotWithShape="0">
+              <a:srgbClr val="000000">
+                <a:alpha val="35000"/>
+              </a:srgbClr>
+            </a:outerShdw>
+          </a:effectLst>
+        </a:effectStyle>
+        <a:effectStyle>
+          <a:effectLst>
+            <a:outerShdw blurRad="40000" dist="23000" dir="5400000" rotWithShape="0">
+              <a:srgbClr val="000000">
+                <a:alpha val="35000"/>
+              </a:srgbClr>
+            </a:outerShdw>
+          </a:effectLst>
+          <a:scene3d>
+            <a:camera prst="orthographicFront">
+              <a:rot lat="0" lon="0" rev="0"/>
+            </a:camera>
+            <a:lightRig rig="threePt" dir="t">
+              <a:rot lat="0" lon="0" rev="1200000"/>
+            </a:lightRig>
+          </a:scene3d>
+          <a:sp3d>
+            <a:bevelT w="63500" h="25400"/>
+          </a:sp3d>
+        </a:effectStyle>
+      </a:effectStyleLst>
+      <a:bgFillStyleLst>
+        <a:solidFill>
+          <a:schemeClr val="phClr"/>
+        </a:solidFill>
+        <a:gradFill rotWithShape="1">
+          <a:gsLst>
+            <a:gs pos="0">
+              <a:schemeClr val="phClr">
+                <a:tint val="40000"/>
+                <a:satMod val="350000"/>
+              </a:schemeClr>
+            </a:gs>
+            <a:gs pos="40000">
+              <a:schemeClr val="phClr">
+                <a:tint val="45000"/>
+                <a:shade val="99000"/>
+                <a:satMod val="350000"/>
+              </a:schemeClr>
+            </a:gs>
+            <a:gs pos="100000">
+              <a:schemeClr val="phClr">
+                <a:shade val="20000"/>
+                <a:satMod val="255000"/>
+              </a:schemeClr>
+            </a:gs>
+          </a:gsLst>
+          <a:path path="circle">
+            <a:fillToRect l="50000" t="-80000" r="50000" b="180000"/>
+          </a:path>
+        </a:gradFill>
+        <a:gradFill rotWithShape="1">
+          <a:gsLst>
+            <a:gs pos="0">
+              <a:schemeClr val="phClr">
+                <a:tint val="80000"/>
+                <a:satMod val="300000"/>
+              </a:schemeClr>
+            </a:gs>
+            <a:gs pos="100000">
+              <a:schemeClr val="phClr">
+                <a:shade val="30000"/>
+                <a:satMod val="200000"/>
+              </a:schemeClr>
+            </a:gs>
+          </a:gsLst>
+          <a:path path="circle">
+            <a:fillToRect l="50000" t="50000" r="50000" b="50000"/>
+          </a:path>
+        </a:gradFill>
+      </a:bgFillStyleLst>
+    </a:fmtScheme>
+  </a:themeElements>
+  <a:objectDefaults/>
+  <a:extraClrSchemeLst/>
+</a:theme>
 </file>
</xml_diff>